<commit_message>
Completed the presentation slides
dasdasd
</commit_message>
<xml_diff>
--- a/Diagnosis of Diabetes using  weight adjusted voting of an Ensemble.pptx
+++ b/Diagnosis of Diabetes using  weight adjusted voting of an Ensemble.pptx
@@ -5,23 +5,24 @@
     <p:sldMasterId id="2147483689" r:id="rId1"/>
   </p:sldMasterIdLst>
   <p:notesMasterIdLst>
-    <p:notesMasterId r:id="rId16"/>
+    <p:notesMasterId r:id="rId17"/>
   </p:notesMasterIdLst>
   <p:sldIdLst>
     <p:sldId id="256" r:id="rId2"/>
     <p:sldId id="257" r:id="rId3"/>
     <p:sldId id="258" r:id="rId4"/>
-    <p:sldId id="262" r:id="rId5"/>
+    <p:sldId id="270" r:id="rId5"/>
     <p:sldId id="263" r:id="rId6"/>
     <p:sldId id="264" r:id="rId7"/>
     <p:sldId id="268" r:id="rId8"/>
     <p:sldId id="269" r:id="rId9"/>
     <p:sldId id="260" r:id="rId10"/>
     <p:sldId id="261" r:id="rId11"/>
-    <p:sldId id="266" r:id="rId12"/>
-    <p:sldId id="265" r:id="rId13"/>
+    <p:sldId id="265" r:id="rId12"/>
+    <p:sldId id="272" r:id="rId13"/>
     <p:sldId id="259" r:id="rId14"/>
     <p:sldId id="267" r:id="rId15"/>
+    <p:sldId id="271" r:id="rId16"/>
   </p:sldIdLst>
   <p:sldSz cx="12192000" cy="6858000"/>
   <p:notesSz cx="6858000" cy="9144000"/>
@@ -129,7 +130,7 @@
 </file>
 
 <file path=ppt/charts/chart1.xml><?xml version="1.0" encoding="utf-8"?>
-<c:chartSpace xmlns:c="http://schemas.openxmlformats.org/drawingml/2006/chart" xmlns:a="http://schemas.openxmlformats.org/drawingml/2006/main" xmlns:r="http://schemas.openxmlformats.org/officeDocument/2006/relationships" xmlns:c16r2="http://schemas.microsoft.com/office/drawing/2015/06/chart">
+<c:chartSpace xmlns:c="http://schemas.openxmlformats.org/drawingml/2006/chart" xmlns:a="http://schemas.openxmlformats.org/drawingml/2006/main" xmlns:r="http://schemas.openxmlformats.org/officeDocument/2006/relationships">
   <c:date1904 val="0"/>
   <c:lang val="en-US"/>
   <c:roundedCorners val="0"/>
@@ -217,7 +218,7 @@
               </a:ln>
               <a:effectLst/>
             </c:spPr>
-            <c:extLst>
+            <c:extLst xmlns:c16r2="http://schemas.microsoft.com/office/drawing/2015/06/chart">
               <c:ext xmlns:c16="http://schemas.microsoft.com/office/drawing/2014/chart" uri="{C3380CC4-5D6E-409C-BE32-E72D297353CC}">
                 <c16:uniqueId val="{00000001-1A0F-4F0F-83F8-F44F541FB294}"/>
               </c:ext>
@@ -252,7 +253,7 @@
               </c:numCache>
             </c:numRef>
           </c:val>
-          <c:extLst>
+          <c:extLst xmlns:c16r2="http://schemas.microsoft.com/office/drawing/2015/06/chart">
             <c:ext xmlns:c16="http://schemas.microsoft.com/office/drawing/2014/chart" uri="{C3380CC4-5D6E-409C-BE32-E72D297353CC}">
               <c16:uniqueId val="{00000002-1A0F-4F0F-83F8-F44F541FB294}"/>
             </c:ext>
@@ -305,7 +306,7 @@
               </c:numCache>
             </c:numRef>
           </c:val>
-          <c:extLst>
+          <c:extLst xmlns:c16r2="http://schemas.microsoft.com/office/drawing/2015/06/chart">
             <c:ext xmlns:c16="http://schemas.microsoft.com/office/drawing/2014/chart" uri="{C3380CC4-5D6E-409C-BE32-E72D297353CC}">
               <c16:uniqueId val="{00000003-1A0F-4F0F-83F8-F44F541FB294}"/>
             </c:ext>
@@ -358,7 +359,7 @@
               </c:numCache>
             </c:numRef>
           </c:val>
-          <c:extLst>
+          <c:extLst xmlns:c16r2="http://schemas.microsoft.com/office/drawing/2015/06/chart">
             <c:ext xmlns:c16="http://schemas.microsoft.com/office/drawing/2014/chart" uri="{C3380CC4-5D6E-409C-BE32-E72D297353CC}">
               <c16:uniqueId val="{00000004-1A0F-4F0F-83F8-F44F541FB294}"/>
             </c:ext>
@@ -374,11 +375,11 @@
         </c:dLbls>
         <c:gapWidth val="219"/>
         <c:overlap val="-27"/>
-        <c:axId val="274517064"/>
-        <c:axId val="274522160"/>
+        <c:axId val="327952168"/>
+        <c:axId val="327950992"/>
       </c:barChart>
       <c:catAx>
-        <c:axId val="274517064"/>
+        <c:axId val="327952168"/>
         <c:scaling>
           <c:orientation val="minMax"/>
         </c:scaling>
@@ -421,7 +422,7 @@
             <a:endParaRPr lang="en-US"/>
           </a:p>
         </c:txPr>
-        <c:crossAx val="274522160"/>
+        <c:crossAx val="327950992"/>
         <c:crosses val="autoZero"/>
         <c:auto val="1"/>
         <c:lblAlgn val="ctr"/>
@@ -429,7 +430,7 @@
         <c:noMultiLvlLbl val="0"/>
       </c:catAx>
       <c:valAx>
-        <c:axId val="274522160"/>
+        <c:axId val="327950992"/>
         <c:scaling>
           <c:orientation val="minMax"/>
         </c:scaling>
@@ -480,7 +481,7 @@
             <a:endParaRPr lang="en-US"/>
           </a:p>
         </c:txPr>
-        <c:crossAx val="274517064"/>
+        <c:crossAx val="327952168"/>
         <c:crosses val="autoZero"/>
         <c:crossBetween val="between"/>
       </c:valAx>
@@ -1477,6 +1478,174 @@
           <a:p>
             <a:fld id="{61F25C85-C087-4087-89D7-C55C5EE39207}" type="slidenum">
               <a:rPr lang="en-US" smtClean="0"/>
+              <a:t>4</a:t>
+            </a:fld>
+            <a:endParaRPr lang="en-US"/>
+          </a:p>
+        </p:txBody>
+      </p:sp>
+    </p:spTree>
+    <p:extLst>
+      <p:ext uri="{BB962C8B-B14F-4D97-AF65-F5344CB8AC3E}">
+        <p14:creationId xmlns:p14="http://schemas.microsoft.com/office/powerpoint/2010/main" val="611410391"/>
+      </p:ext>
+    </p:extLst>
+  </p:cSld>
+  <p:clrMapOvr>
+    <a:masterClrMapping/>
+  </p:clrMapOvr>
+</p:notes>
+</file>
+
+<file path=ppt/notesSlides/notesSlide2.xml><?xml version="1.0" encoding="utf-8"?>
+<p:notes xmlns:a="http://schemas.openxmlformats.org/drawingml/2006/main" xmlns:r="http://schemas.openxmlformats.org/officeDocument/2006/relationships" xmlns:p="http://schemas.openxmlformats.org/presentationml/2006/main">
+  <p:cSld>
+    <p:spTree>
+      <p:nvGrpSpPr>
+        <p:cNvPr id="1" name=""/>
+        <p:cNvGrpSpPr/>
+        <p:nvPr/>
+      </p:nvGrpSpPr>
+      <p:grpSpPr>
+        <a:xfrm>
+          <a:off x="0" y="0"/>
+          <a:ext cx="0" cy="0"/>
+          <a:chOff x="0" y="0"/>
+          <a:chExt cx="0" cy="0"/>
+        </a:xfrm>
+      </p:grpSpPr>
+      <p:sp>
+        <p:nvSpPr>
+          <p:cNvPr id="2" name="Slide Image Placeholder 1"/>
+          <p:cNvSpPr>
+            <a:spLocks noGrp="1" noRot="1" noChangeAspect="1"/>
+          </p:cNvSpPr>
+          <p:nvPr>
+            <p:ph type="sldImg"/>
+          </p:nvPr>
+        </p:nvSpPr>
+        <p:spPr/>
+      </p:sp>
+      <p:sp>
+        <p:nvSpPr>
+          <p:cNvPr id="3" name="Notes Placeholder 2"/>
+          <p:cNvSpPr>
+            <a:spLocks noGrp="1"/>
+          </p:cNvSpPr>
+          <p:nvPr>
+            <p:ph type="body" idx="1"/>
+          </p:nvPr>
+        </p:nvSpPr>
+        <p:spPr/>
+        <p:txBody>
+          <a:bodyPr/>
+          <a:lstStyle/>
+          <a:p>
+            <a:endParaRPr lang="en-US" dirty="0"/>
+          </a:p>
+        </p:txBody>
+      </p:sp>
+      <p:sp>
+        <p:nvSpPr>
+          <p:cNvPr id="4" name="Slide Number Placeholder 3"/>
+          <p:cNvSpPr>
+            <a:spLocks noGrp="1"/>
+          </p:cNvSpPr>
+          <p:nvPr>
+            <p:ph type="sldNum" sz="quarter" idx="10"/>
+          </p:nvPr>
+        </p:nvSpPr>
+        <p:spPr/>
+        <p:txBody>
+          <a:bodyPr/>
+          <a:lstStyle/>
+          <a:p>
+            <a:fld id="{61F25C85-C087-4087-89D7-C55C5EE39207}" type="slidenum">
+              <a:rPr lang="en-US" smtClean="0"/>
+              <a:t>5</a:t>
+            </a:fld>
+            <a:endParaRPr lang="en-US"/>
+          </a:p>
+        </p:txBody>
+      </p:sp>
+    </p:spTree>
+    <p:extLst>
+      <p:ext uri="{BB962C8B-B14F-4D97-AF65-F5344CB8AC3E}">
+        <p14:creationId xmlns:p14="http://schemas.microsoft.com/office/powerpoint/2010/main" val="3836159251"/>
+      </p:ext>
+    </p:extLst>
+  </p:cSld>
+  <p:clrMapOvr>
+    <a:masterClrMapping/>
+  </p:clrMapOvr>
+</p:notes>
+</file>
+
+<file path=ppt/notesSlides/notesSlide3.xml><?xml version="1.0" encoding="utf-8"?>
+<p:notes xmlns:a="http://schemas.openxmlformats.org/drawingml/2006/main" xmlns:r="http://schemas.openxmlformats.org/officeDocument/2006/relationships" xmlns:p="http://schemas.openxmlformats.org/presentationml/2006/main">
+  <p:cSld>
+    <p:spTree>
+      <p:nvGrpSpPr>
+        <p:cNvPr id="1" name=""/>
+        <p:cNvGrpSpPr/>
+        <p:nvPr/>
+      </p:nvGrpSpPr>
+      <p:grpSpPr>
+        <a:xfrm>
+          <a:off x="0" y="0"/>
+          <a:ext cx="0" cy="0"/>
+          <a:chOff x="0" y="0"/>
+          <a:chExt cx="0" cy="0"/>
+        </a:xfrm>
+      </p:grpSpPr>
+      <p:sp>
+        <p:nvSpPr>
+          <p:cNvPr id="2" name="Slide Image Placeholder 1"/>
+          <p:cNvSpPr>
+            <a:spLocks noGrp="1" noRot="1" noChangeAspect="1"/>
+          </p:cNvSpPr>
+          <p:nvPr>
+            <p:ph type="sldImg"/>
+          </p:nvPr>
+        </p:nvSpPr>
+        <p:spPr/>
+      </p:sp>
+      <p:sp>
+        <p:nvSpPr>
+          <p:cNvPr id="3" name="Notes Placeholder 2"/>
+          <p:cNvSpPr>
+            <a:spLocks noGrp="1"/>
+          </p:cNvSpPr>
+          <p:nvPr>
+            <p:ph type="body" idx="1"/>
+          </p:nvPr>
+        </p:nvSpPr>
+        <p:spPr/>
+        <p:txBody>
+          <a:bodyPr/>
+          <a:lstStyle/>
+          <a:p>
+            <a:endParaRPr lang="en-US" dirty="0"/>
+          </a:p>
+        </p:txBody>
+      </p:sp>
+      <p:sp>
+        <p:nvSpPr>
+          <p:cNvPr id="4" name="Slide Number Placeholder 3"/>
+          <p:cNvSpPr>
+            <a:spLocks noGrp="1"/>
+          </p:cNvSpPr>
+          <p:nvPr>
+            <p:ph type="sldNum" sz="quarter" idx="10"/>
+          </p:nvPr>
+        </p:nvSpPr>
+        <p:spPr/>
+        <p:txBody>
+          <a:bodyPr/>
+          <a:lstStyle/>
+          <a:p>
+            <a:fld id="{61F25C85-C087-4087-89D7-C55C5EE39207}" type="slidenum">
+              <a:rPr lang="en-US" smtClean="0"/>
               <a:t>10</a:t>
             </a:fld>
             <a:endParaRPr lang="en-US"/>
@@ -7822,7 +7991,7 @@
             <a:pPr algn="ctr"/>
             <a:r>
               <a:rPr lang="en-US" sz="3600" b="1" u="sng" dirty="0" smtClean="0"/>
-              <a:t>Other Challenges</a:t>
+              <a:t>Future work</a:t>
             </a:r>
             <a:endParaRPr lang="en-US" sz="3600" b="1" u="sng" dirty="0"/>
           </a:p>
@@ -7836,8 +8005,8 @@
         </p:nvSpPr>
         <p:spPr>
           <a:xfrm>
-            <a:off x="491319" y="1255594"/>
-            <a:ext cx="11409529" cy="1477328"/>
+            <a:off x="504969" y="1542199"/>
+            <a:ext cx="11286698" cy="4154984"/>
           </a:xfrm>
           <a:prstGeom prst="rect">
             <a:avLst/>
@@ -7855,8 +8024,8 @@
               <a:buChar char="•"/>
             </a:pPr>
             <a:r>
-              <a:rPr lang="en-US" dirty="0" smtClean="0"/>
-              <a:t>Very few samples – Only 768 !!</a:t>
+              <a:rPr lang="en-US" sz="2400" dirty="0" smtClean="0"/>
+              <a:t>Try data Imputation – fill in missing values using regression</a:t>
             </a:r>
           </a:p>
           <a:p>
@@ -7864,7 +8033,7 @@
               <a:buFont typeface="Arial" panose="020B0604020202020204" pitchFamily="34" charset="0"/>
               <a:buChar char="•"/>
             </a:pPr>
-            <a:endParaRPr lang="en-US" dirty="0"/>
+            <a:endParaRPr lang="en-US" sz="2400" dirty="0"/>
           </a:p>
           <a:p>
             <a:pPr marL="285750" indent="-285750">
@@ -7872,43 +8041,83 @@
               <a:buChar char="•"/>
             </a:pPr>
             <a:r>
-              <a:rPr lang="en-US" dirty="0" smtClean="0"/>
-              <a:t>Hard to Visualize*</a:t>
-            </a:r>
+              <a:rPr lang="en-US" sz="2400" dirty="0" smtClean="0"/>
+              <a:t>Feature Selection</a:t>
+            </a:r>
+          </a:p>
+          <a:p>
+            <a:endParaRPr lang="en-US" sz="2400" dirty="0" smtClean="0"/>
           </a:p>
           <a:p>
             <a:pPr marL="285750" indent="-285750">
               <a:buFont typeface="Arial" panose="020B0604020202020204" pitchFamily="34" charset="0"/>
               <a:buChar char="•"/>
             </a:pPr>
-            <a:endParaRPr lang="en-US" dirty="0"/>
+            <a:r>
+              <a:rPr lang="en-US" sz="2400" dirty="0" smtClean="0"/>
+              <a:t>Handle Outliers </a:t>
+            </a:r>
           </a:p>
           <a:p>
             <a:pPr marL="285750" indent="-285750">
               <a:buFont typeface="Arial" panose="020B0604020202020204" pitchFamily="34" charset="0"/>
               <a:buChar char="•"/>
             </a:pPr>
-            <a:endParaRPr lang="en-US" dirty="0"/>
+            <a:endParaRPr lang="en-US" sz="2400" dirty="0"/>
+          </a:p>
+          <a:p>
+            <a:pPr marL="285750" indent="-285750">
+              <a:buFont typeface="Arial" panose="020B0604020202020204" pitchFamily="34" charset="0"/>
+              <a:buChar char="•"/>
+            </a:pPr>
+            <a:r>
+              <a:rPr lang="en-US" sz="2400" dirty="0" smtClean="0"/>
+              <a:t>Try other Diabetes Datasets </a:t>
+            </a:r>
+          </a:p>
+          <a:p>
+            <a:pPr marL="285750" indent="-285750">
+              <a:buFont typeface="Arial" panose="020B0604020202020204" pitchFamily="34" charset="0"/>
+              <a:buChar char="•"/>
+            </a:pPr>
+            <a:endParaRPr lang="en-US" sz="2400" dirty="0"/>
+          </a:p>
+          <a:p>
+            <a:pPr marL="285750" indent="-285750">
+              <a:buFont typeface="Arial" panose="020B0604020202020204" pitchFamily="34" charset="0"/>
+              <a:buChar char="•"/>
+            </a:pPr>
+            <a:r>
+              <a:rPr lang="en-US" sz="2400" dirty="0" smtClean="0"/>
+              <a:t>Extend it to work for other Diseases ex: Cancer etc.</a:t>
+            </a:r>
+          </a:p>
+          <a:p>
+            <a:pPr marL="285750" indent="-285750">
+              <a:buFont typeface="Arial" panose="020B0604020202020204" pitchFamily="34" charset="0"/>
+              <a:buChar char="•"/>
+            </a:pPr>
+            <a:endParaRPr lang="en-US" sz="2400" dirty="0"/>
+          </a:p>
+          <a:p>
+            <a:pPr marL="285750" indent="-285750">
+              <a:buFont typeface="Arial" panose="020B0604020202020204" pitchFamily="34" charset="0"/>
+              <a:buChar char="•"/>
+            </a:pPr>
+            <a:endParaRPr lang="en-US" sz="2400" dirty="0"/>
           </a:p>
         </p:txBody>
       </p:sp>
     </p:spTree>
     <p:extLst>
       <p:ext uri="{BB962C8B-B14F-4D97-AF65-F5344CB8AC3E}">
-        <p14:creationId xmlns:p14="http://schemas.microsoft.com/office/powerpoint/2010/main" val="4101597893"/>
+        <p14:creationId xmlns:p14="http://schemas.microsoft.com/office/powerpoint/2010/main" val="2937711133"/>
       </p:ext>
     </p:extLst>
   </p:cSld>
   <p:clrMapOvr>
     <a:masterClrMapping/>
   </p:clrMapOvr>
-  <p:timing>
-    <p:tnLst>
-      <p:par>
-        <p:cTn id="1" dur="indefinite" restart="never" nodeType="tmRoot"/>
-      </p:par>
-    </p:tnLst>
-  </p:timing>
 </p:sld>
 </file>
 
@@ -7937,8 +8146,8 @@
         </p:nvSpPr>
         <p:spPr>
           <a:xfrm>
-            <a:off x="2661313" y="191069"/>
-            <a:ext cx="6032311" cy="646331"/>
+            <a:off x="2715904" y="395785"/>
+            <a:ext cx="6018663" cy="523220"/>
           </a:xfrm>
           <a:prstGeom prst="rect">
             <a:avLst/>
@@ -7953,10 +8162,10 @@
           <a:p>
             <a:pPr algn="ctr"/>
             <a:r>
-              <a:rPr lang="en-US" sz="3600" b="1" u="sng" dirty="0" smtClean="0"/>
-              <a:t>Future work</a:t>
-            </a:r>
-            <a:endParaRPr lang="en-US" sz="3600" b="1" u="sng" dirty="0"/>
+              <a:rPr lang="en-US" sz="2800" b="1" u="sng" dirty="0"/>
+              <a:t>What I Learned</a:t>
+            </a:r>
+            <a:endParaRPr lang="en-US" sz="2800" b="1" u="sng" dirty="0"/>
           </a:p>
         </p:txBody>
       </p:sp>
@@ -7968,8 +8177,8 @@
         </p:nvSpPr>
         <p:spPr>
           <a:xfrm>
-            <a:off x="504969" y="1542199"/>
-            <a:ext cx="11286698" cy="4893647"/>
+            <a:off x="805218" y="1705970"/>
+            <a:ext cx="7697337" cy="4093428"/>
           </a:xfrm>
           <a:prstGeom prst="rect">
             <a:avLst/>
@@ -7987,8 +8196,8 @@
               <a:buChar char="•"/>
             </a:pPr>
             <a:r>
-              <a:rPr lang="en-US" sz="2400" dirty="0" smtClean="0"/>
-              <a:t>Try data Imputation – fill in missing values using regression</a:t>
+              <a:rPr lang="en-US" sz="2000" dirty="0" smtClean="0"/>
+              <a:t>Machine Learning</a:t>
             </a:r>
           </a:p>
           <a:p>
@@ -7996,20 +8205,14 @@
               <a:buFont typeface="Arial" panose="020B0604020202020204" pitchFamily="34" charset="0"/>
               <a:buChar char="•"/>
             </a:pPr>
-            <a:endParaRPr lang="en-US" sz="2400" dirty="0"/>
+            <a:endParaRPr lang="en-US" sz="2000" dirty="0" smtClean="0"/>
           </a:p>
           <a:p>
             <a:pPr marL="285750" indent="-285750">
               <a:buFont typeface="Arial" panose="020B0604020202020204" pitchFamily="34" charset="0"/>
               <a:buChar char="•"/>
             </a:pPr>
-            <a:r>
-              <a:rPr lang="en-US" sz="2400" dirty="0" smtClean="0"/>
-              <a:t>Feature Selection</a:t>
-            </a:r>
-          </a:p>
-          <a:p>
-            <a:endParaRPr lang="en-US" sz="2400" dirty="0" smtClean="0"/>
+            <a:endParaRPr lang="en-US" sz="2000" dirty="0" smtClean="0"/>
           </a:p>
           <a:p>
             <a:pPr marL="285750" indent="-285750">
@@ -8017,8 +8220,12 @@
               <a:buChar char="•"/>
             </a:pPr>
             <a:r>
-              <a:rPr lang="en-US" sz="2400" dirty="0" smtClean="0"/>
-              <a:t>Feature Engineering</a:t>
+              <a:rPr lang="en-US" sz="2000" dirty="0"/>
+              <a:t>A</a:t>
+            </a:r>
+            <a:r>
+              <a:rPr lang="en-US" sz="2000" dirty="0" smtClean="0"/>
+              <a:t>utomated Pipeline </a:t>
             </a:r>
           </a:p>
           <a:p>
@@ -8026,41 +8233,38 @@
               <a:buFont typeface="Arial" panose="020B0604020202020204" pitchFamily="34" charset="0"/>
               <a:buChar char="•"/>
             </a:pPr>
-            <a:endParaRPr lang="en-US" sz="2400" dirty="0" smtClean="0"/>
+            <a:endParaRPr lang="en-US" sz="2000" dirty="0"/>
           </a:p>
           <a:p>
             <a:pPr marL="285750" indent="-285750">
               <a:buFont typeface="Arial" panose="020B0604020202020204" pitchFamily="34" charset="0"/>
               <a:buChar char="•"/>
             </a:pPr>
-            <a:r>
-              <a:rPr lang="en-US" sz="2400" dirty="0" smtClean="0"/>
-              <a:t>Handle Outliers </a:t>
-            </a:r>
+            <a:endParaRPr lang="en-US" sz="2000" dirty="0" smtClean="0"/>
           </a:p>
           <a:p>
             <a:pPr marL="285750" indent="-285750">
               <a:buFont typeface="Arial" panose="020B0604020202020204" pitchFamily="34" charset="0"/>
               <a:buChar char="•"/>
             </a:pPr>
-            <a:endParaRPr lang="en-US" sz="2400" dirty="0"/>
+            <a:r>
+              <a:rPr lang="en-US" sz="2000" dirty="0" smtClean="0"/>
+              <a:t>Matlab/Octave</a:t>
+            </a:r>
           </a:p>
           <a:p>
             <a:pPr marL="285750" indent="-285750">
               <a:buFont typeface="Arial" panose="020B0604020202020204" pitchFamily="34" charset="0"/>
               <a:buChar char="•"/>
             </a:pPr>
-            <a:r>
-              <a:rPr lang="en-US" sz="2400" dirty="0" smtClean="0"/>
-              <a:t>Try other Diabetes Datasets </a:t>
-            </a:r>
+            <a:endParaRPr lang="en-US" sz="2000" dirty="0" smtClean="0"/>
           </a:p>
           <a:p>
             <a:pPr marL="285750" indent="-285750">
               <a:buFont typeface="Arial" panose="020B0604020202020204" pitchFamily="34" charset="0"/>
               <a:buChar char="•"/>
             </a:pPr>
-            <a:endParaRPr lang="en-US" sz="2400" dirty="0"/>
+            <a:endParaRPr lang="en-US" sz="2000" dirty="0"/>
           </a:p>
           <a:p>
             <a:pPr marL="285750" indent="-285750">
@@ -8068,8 +8272,8 @@
               <a:buChar char="•"/>
             </a:pPr>
             <a:r>
-              <a:rPr lang="en-US" sz="2400" dirty="0" smtClean="0"/>
-              <a:t>Extend it to work for other Diseases ex: Cancer etc.</a:t>
+              <a:rPr lang="en-US" sz="2000" dirty="0" smtClean="0"/>
+              <a:t>Python</a:t>
             </a:r>
           </a:p>
           <a:p>
@@ -8077,21 +8281,32 @@
               <a:buFont typeface="Arial" panose="020B0604020202020204" pitchFamily="34" charset="0"/>
               <a:buChar char="•"/>
             </a:pPr>
-            <a:endParaRPr lang="en-US" sz="2400" dirty="0"/>
+            <a:endParaRPr lang="en-US" sz="2000" dirty="0" smtClean="0"/>
           </a:p>
           <a:p>
             <a:pPr marL="285750" indent="-285750">
               <a:buFont typeface="Arial" panose="020B0604020202020204" pitchFamily="34" charset="0"/>
               <a:buChar char="•"/>
             </a:pPr>
-            <a:endParaRPr lang="en-US" sz="2400" dirty="0"/>
+            <a:endParaRPr lang="en-US" sz="2000" dirty="0"/>
+          </a:p>
+          <a:p>
+            <a:pPr marL="285750" indent="-285750">
+              <a:buFont typeface="Arial" panose="020B0604020202020204" pitchFamily="34" charset="0"/>
+              <a:buChar char="•"/>
+            </a:pPr>
+            <a:r>
+              <a:rPr lang="en-US" sz="2000" dirty="0" smtClean="0"/>
+              <a:t>Scikit-Learn, Ipython, Pandas, Numpy </a:t>
+            </a:r>
+            <a:endParaRPr lang="en-US" sz="2000" dirty="0"/>
           </a:p>
         </p:txBody>
       </p:sp>
     </p:spTree>
     <p:extLst>
       <p:ext uri="{BB962C8B-B14F-4D97-AF65-F5344CB8AC3E}">
-        <p14:creationId xmlns:p14="http://schemas.microsoft.com/office/powerpoint/2010/main" val="2937711133"/>
+        <p14:creationId xmlns:p14="http://schemas.microsoft.com/office/powerpoint/2010/main" val="2580578379"/>
       </p:ext>
     </p:extLst>
   </p:cSld>
@@ -8157,8 +8372,8 @@
         </p:nvSpPr>
         <p:spPr>
           <a:xfrm>
-            <a:off x="450377" y="2047164"/>
-            <a:ext cx="10058400" cy="2031325"/>
+            <a:off x="504968" y="1555845"/>
+            <a:ext cx="10058400" cy="3416320"/>
           </a:xfrm>
           <a:prstGeom prst="rect">
             <a:avLst/>
@@ -8177,7 +8392,42 @@
             </a:pPr>
             <a:r>
               <a:rPr lang="en-US" dirty="0" smtClean="0"/>
-              <a:t>With a complete dataset (no missing values) and sufficient enough samples this model can be very successful and can be used in real time</a:t>
+              <a:t>The Weight Adjusted voting approach is really efficient in increasing the performance of the model</a:t>
+            </a:r>
+          </a:p>
+          <a:p>
+            <a:pPr marL="285750" indent="-285750">
+              <a:buFont typeface="Arial" panose="020B0604020202020204" pitchFamily="34" charset="0"/>
+              <a:buChar char="•"/>
+            </a:pPr>
+            <a:endParaRPr lang="en-US" dirty="0" smtClean="0"/>
+          </a:p>
+          <a:p>
+            <a:pPr marL="285750" indent="-285750">
+              <a:buFont typeface="Arial" panose="020B0604020202020204" pitchFamily="34" charset="0"/>
+              <a:buChar char="•"/>
+            </a:pPr>
+            <a:endParaRPr lang="en-US" dirty="0" smtClean="0"/>
+          </a:p>
+          <a:p>
+            <a:pPr marL="285750" indent="-285750">
+              <a:buFont typeface="Arial" panose="020B0604020202020204" pitchFamily="34" charset="0"/>
+              <a:buChar char="•"/>
+            </a:pPr>
+            <a:endParaRPr lang="en-US" dirty="0"/>
+          </a:p>
+          <a:p>
+            <a:pPr marL="285750" indent="-285750">
+              <a:buFont typeface="Arial" panose="020B0604020202020204" pitchFamily="34" charset="0"/>
+              <a:buChar char="•"/>
+            </a:pPr>
+            <a:r>
+              <a:rPr lang="en-US" dirty="0" smtClean="0"/>
+              <a:t>With </a:t>
+            </a:r>
+            <a:r>
+              <a:rPr lang="en-US" dirty="0" smtClean="0"/>
+              <a:t>a complete dataset (no missing values) and sufficient enough samples this model can be very successful and can be used in real time</a:t>
             </a:r>
           </a:p>
           <a:p>
@@ -8266,10 +8516,263 @@
           </a:p>
         </p:txBody>
       </p:sp>
+      <p:sp>
+        <p:nvSpPr>
+          <p:cNvPr id="3" name="TextBox 2"/>
+          <p:cNvSpPr txBox="1"/>
+          <p:nvPr/>
+        </p:nvSpPr>
+        <p:spPr>
+          <a:xfrm>
+            <a:off x="586854" y="1310185"/>
+            <a:ext cx="10781731" cy="4247317"/>
+          </a:xfrm>
+          <a:prstGeom prst="rect">
+            <a:avLst/>
+          </a:prstGeom>
+          <a:noFill/>
+        </p:spPr>
+        <p:txBody>
+          <a:bodyPr wrap="square" rtlCol="0">
+            <a:spAutoFit/>
+          </a:bodyPr>
+          <a:lstStyle/>
+          <a:p>
+            <a:pPr marL="285750" indent="-285750">
+              <a:buFont typeface="Arial" panose="020B0604020202020204" pitchFamily="34" charset="0"/>
+              <a:buChar char="•"/>
+            </a:pPr>
+            <a:r>
+              <a:rPr lang="en-US" dirty="0" smtClean="0"/>
+              <a:t>“</a:t>
+            </a:r>
+            <a:r>
+              <a:rPr lang="en-US" i="1" dirty="0" smtClean="0"/>
+              <a:t>Diagnosis </a:t>
+            </a:r>
+            <a:r>
+              <a:rPr lang="en-US" i="1" dirty="0"/>
+              <a:t>of Diabetes using a Weight-Adjusted Voting </a:t>
+            </a:r>
+            <a:r>
+              <a:rPr lang="en-US" i="1" dirty="0" smtClean="0"/>
+              <a:t>Approach</a:t>
+            </a:r>
+            <a:r>
+              <a:rPr lang="en-US" dirty="0" smtClean="0"/>
+              <a:t>” - Lin </a:t>
+            </a:r>
+            <a:r>
+              <a:rPr lang="en-US" dirty="0"/>
+              <a:t>Li, the Proceeding of 14th IEEE International Conference on Bioinformatics and Bioengineering (BIBE 2014), pp. 320 - 324, Boca Raton, Nov 10 - 12, 2014</a:t>
+            </a:r>
+            <a:r>
+              <a:rPr lang="en-US" dirty="0" smtClean="0"/>
+              <a:t>.</a:t>
+            </a:r>
+          </a:p>
+          <a:p>
+            <a:pPr marL="285750" indent="-285750">
+              <a:buFont typeface="Arial" panose="020B0604020202020204" pitchFamily="34" charset="0"/>
+              <a:buChar char="•"/>
+            </a:pPr>
+            <a:endParaRPr lang="en-US" dirty="0"/>
+          </a:p>
+          <a:p>
+            <a:pPr marL="285750" indent="-285750">
+              <a:buFont typeface="Arial" panose="020B0604020202020204" pitchFamily="34" charset="0"/>
+              <a:buChar char="•"/>
+            </a:pPr>
+            <a:r>
+              <a:rPr lang="en-US" dirty="0">
+                <a:hlinkClick r:id="rId2"/>
+              </a:rPr>
+              <a:t>https://</a:t>
+            </a:r>
+            <a:r>
+              <a:rPr lang="en-US" dirty="0" smtClean="0">
+                <a:hlinkClick r:id="rId2"/>
+              </a:rPr>
+              <a:t>archive.ics.uci.edu/ml/datasets/Pima+Indians+Diabetes</a:t>
+            </a:r>
+            <a:endParaRPr lang="en-US" dirty="0" smtClean="0"/>
+          </a:p>
+          <a:p>
+            <a:endParaRPr lang="en-US" dirty="0"/>
+          </a:p>
+          <a:p>
+            <a:pPr marL="285750" indent="-285750">
+              <a:buFont typeface="Arial" panose="020B0604020202020204" pitchFamily="34" charset="0"/>
+              <a:buChar char="•"/>
+            </a:pPr>
+            <a:r>
+              <a:rPr lang="en-US" dirty="0" smtClean="0"/>
+              <a:t>Coursera.com – “Machine Learning” by Andrew Ng (MOOC)</a:t>
+            </a:r>
+          </a:p>
+          <a:p>
+            <a:pPr marL="285750" indent="-285750">
+              <a:buFont typeface="Arial" panose="020B0604020202020204" pitchFamily="34" charset="0"/>
+              <a:buChar char="•"/>
+            </a:pPr>
+            <a:endParaRPr lang="en-US" dirty="0"/>
+          </a:p>
+          <a:p>
+            <a:pPr marL="285750" indent="-285750">
+              <a:buFont typeface="Arial" panose="020B0604020202020204" pitchFamily="34" charset="0"/>
+              <a:buChar char="•"/>
+            </a:pPr>
+            <a:r>
+              <a:rPr lang="en-US" dirty="0">
+                <a:hlinkClick r:id="rId3"/>
+              </a:rPr>
+              <a:t>http://scikit-learn.org/stable</a:t>
+            </a:r>
+            <a:r>
+              <a:rPr lang="en-US" dirty="0" smtClean="0">
+                <a:hlinkClick r:id="rId3"/>
+              </a:rPr>
+              <a:t>/</a:t>
+            </a:r>
+            <a:endParaRPr lang="en-US" dirty="0" smtClean="0"/>
+          </a:p>
+          <a:p>
+            <a:pPr marL="285750" indent="-285750">
+              <a:buFont typeface="Arial" panose="020B0604020202020204" pitchFamily="34" charset="0"/>
+              <a:buChar char="•"/>
+            </a:pPr>
+            <a:endParaRPr lang="en-US" dirty="0"/>
+          </a:p>
+          <a:p>
+            <a:pPr marL="285750" indent="-285750">
+              <a:buFont typeface="Arial" panose="020B0604020202020204" pitchFamily="34" charset="0"/>
+              <a:buChar char="•"/>
+            </a:pPr>
+            <a:r>
+              <a:rPr lang="en-US" dirty="0">
+                <a:hlinkClick r:id="rId4"/>
+              </a:rPr>
+              <a:t>http://pandas.pydata.org</a:t>
+            </a:r>
+            <a:r>
+              <a:rPr lang="en-US" dirty="0" smtClean="0">
+                <a:hlinkClick r:id="rId4"/>
+              </a:rPr>
+              <a:t>/</a:t>
+            </a:r>
+            <a:endParaRPr lang="en-US" dirty="0" smtClean="0"/>
+          </a:p>
+          <a:p>
+            <a:pPr marL="285750" indent="-285750">
+              <a:buFont typeface="Arial" panose="020B0604020202020204" pitchFamily="34" charset="0"/>
+              <a:buChar char="•"/>
+            </a:pPr>
+            <a:endParaRPr lang="en-US" dirty="0"/>
+          </a:p>
+          <a:p>
+            <a:pPr marL="285750" indent="-285750">
+              <a:buFont typeface="Arial" panose="020B0604020202020204" pitchFamily="34" charset="0"/>
+              <a:buChar char="•"/>
+            </a:pPr>
+            <a:r>
+              <a:rPr lang="en-US" dirty="0"/>
+              <a:t>Anaconda - </a:t>
+            </a:r>
+            <a:r>
+              <a:rPr lang="en-US" dirty="0">
+                <a:hlinkClick r:id="rId5"/>
+              </a:rPr>
+              <a:t>https://</a:t>
+            </a:r>
+            <a:r>
+              <a:rPr lang="en-US" dirty="0" smtClean="0">
+                <a:hlinkClick r:id="rId5"/>
+              </a:rPr>
+              <a:t>www.continuum.io/documentation</a:t>
+            </a:r>
+            <a:endParaRPr lang="en-US" dirty="0" smtClean="0"/>
+          </a:p>
+          <a:p>
+            <a:pPr marL="285750" indent="-285750">
+              <a:buFont typeface="Arial" panose="020B0604020202020204" pitchFamily="34" charset="0"/>
+              <a:buChar char="•"/>
+            </a:pPr>
+            <a:endParaRPr lang="en-US" dirty="0"/>
+          </a:p>
+          <a:p>
+            <a:pPr marL="285750" indent="-285750">
+              <a:buFont typeface="Arial" panose="020B0604020202020204" pitchFamily="34" charset="0"/>
+              <a:buChar char="•"/>
+            </a:pPr>
+            <a:endParaRPr lang="en-US" dirty="0"/>
+          </a:p>
+        </p:txBody>
+      </p:sp>
     </p:spTree>
     <p:extLst>
       <p:ext uri="{BB962C8B-B14F-4D97-AF65-F5344CB8AC3E}">
         <p14:creationId xmlns:p14="http://schemas.microsoft.com/office/powerpoint/2010/main" val="2996077751"/>
+      </p:ext>
+    </p:extLst>
+  </p:cSld>
+  <p:clrMapOvr>
+    <a:masterClrMapping/>
+  </p:clrMapOvr>
+</p:sld>
+</file>
+
+<file path=ppt/slides/slide15.xml><?xml version="1.0" encoding="utf-8"?>
+<p:sld xmlns:a="http://schemas.openxmlformats.org/drawingml/2006/main" xmlns:r="http://schemas.openxmlformats.org/officeDocument/2006/relationships" xmlns:p="http://schemas.openxmlformats.org/presentationml/2006/main">
+  <p:cSld>
+    <p:spTree>
+      <p:nvGrpSpPr>
+        <p:cNvPr id="1" name=""/>
+        <p:cNvGrpSpPr/>
+        <p:nvPr/>
+      </p:nvGrpSpPr>
+      <p:grpSpPr>
+        <a:xfrm>
+          <a:off x="0" y="0"/>
+          <a:ext cx="0" cy="0"/>
+          <a:chOff x="0" y="0"/>
+          <a:chExt cx="0" cy="0"/>
+        </a:xfrm>
+      </p:grpSpPr>
+      <p:sp>
+        <p:nvSpPr>
+          <p:cNvPr id="2" name="TextBox 1"/>
+          <p:cNvSpPr txBox="1"/>
+          <p:nvPr/>
+        </p:nvSpPr>
+        <p:spPr>
+          <a:xfrm>
+            <a:off x="3411940" y="2524836"/>
+            <a:ext cx="5090615" cy="1200329"/>
+          </a:xfrm>
+          <a:prstGeom prst="rect">
+            <a:avLst/>
+          </a:prstGeom>
+          <a:noFill/>
+        </p:spPr>
+        <p:txBody>
+          <a:bodyPr wrap="square" rtlCol="0">
+            <a:spAutoFit/>
+          </a:bodyPr>
+          <a:lstStyle/>
+          <a:p>
+            <a:pPr algn="ctr"/>
+            <a:r>
+              <a:rPr lang="en-US" sz="7200" dirty="0" smtClean="0"/>
+              <a:t>Thank You!</a:t>
+            </a:r>
+            <a:endParaRPr lang="en-US" sz="7200" dirty="0"/>
+          </a:p>
+        </p:txBody>
+      </p:sp>
+    </p:spTree>
+    <p:extLst>
+      <p:ext uri="{BB962C8B-B14F-4D97-AF65-F5344CB8AC3E}">
+        <p14:creationId xmlns:p14="http://schemas.microsoft.com/office/powerpoint/2010/main" val="1089423706"/>
       </p:ext>
     </p:extLst>
   </p:cSld>
@@ -8653,40 +9156,2502 @@
           </a:p>
         </p:txBody>
       </p:sp>
-      <p:pic>
-        <p:nvPicPr>
-          <p:cNvPr id="3" name="Picture 2"/>
-          <p:cNvPicPr>
-            <a:picLocks noChangeAspect="1"/>
-          </p:cNvPicPr>
+      <p:sp>
+        <p:nvSpPr>
+          <p:cNvPr id="49" name="Rectangle 48"/>
+          <p:cNvSpPr/>
           <p:nvPr/>
-        </p:nvPicPr>
-        <p:blipFill>
-          <a:blip r:embed="rId2">
-            <a:extLst>
-              <a:ext uri="{28A0092B-C50C-407E-A947-70E740481C1C}">
-                <a14:useLocalDpi xmlns:a14="http://schemas.microsoft.com/office/drawing/2010/main" val="0"/>
-              </a:ext>
-            </a:extLst>
-          </a:blip>
-          <a:stretch>
-            <a:fillRect/>
-          </a:stretch>
-        </p:blipFill>
+        </p:nvSpPr>
         <p:spPr>
           <a:xfrm>
-            <a:off x="2536417" y="953880"/>
-            <a:ext cx="5952491" cy="5687219"/>
+            <a:off x="5361555" y="1589647"/>
+            <a:ext cx="869051" cy="1698904"/>
           </a:xfrm>
           <a:prstGeom prst="rect">
             <a:avLst/>
           </a:prstGeom>
+          <a:gradFill flip="none" rotWithShape="1">
+            <a:gsLst>
+              <a:gs pos="0">
+                <a:srgbClr val="00B0F0">
+                  <a:shade val="30000"/>
+                  <a:satMod val="115000"/>
+                </a:srgbClr>
+              </a:gs>
+              <a:gs pos="50000">
+                <a:srgbClr val="00B0F0">
+                  <a:shade val="67500"/>
+                  <a:satMod val="115000"/>
+                </a:srgbClr>
+              </a:gs>
+              <a:gs pos="100000">
+                <a:srgbClr val="00B0F0">
+                  <a:shade val="100000"/>
+                  <a:satMod val="115000"/>
+                </a:srgbClr>
+              </a:gs>
+            </a:gsLst>
+            <a:lin ang="5400000" scaled="1"/>
+            <a:tileRect/>
+          </a:gradFill>
+          <a:ln w="19050">
+            <a:solidFill>
+              <a:schemeClr val="bg1"/>
+            </a:solidFill>
+          </a:ln>
         </p:spPr>
-      </p:pic>
+        <p:style>
+          <a:lnRef idx="2">
+            <a:schemeClr val="accent1">
+              <a:shade val="50000"/>
+            </a:schemeClr>
+          </a:lnRef>
+          <a:fillRef idx="1">
+            <a:schemeClr val="accent1"/>
+          </a:fillRef>
+          <a:effectRef idx="0">
+            <a:schemeClr val="accent1"/>
+          </a:effectRef>
+          <a:fontRef idx="minor">
+            <a:schemeClr val="lt1"/>
+          </a:fontRef>
+        </p:style>
+        <p:txBody>
+          <a:bodyPr rtlCol="0" anchor="ctr"/>
+          <a:lstStyle/>
+          <a:p>
+            <a:pPr algn="ctr"/>
+            <a:r>
+              <a:rPr lang="en-US" sz="1200" dirty="0"/>
+              <a:t>Dataset 2</a:t>
+            </a:r>
+          </a:p>
+        </p:txBody>
+      </p:sp>
+      <p:grpSp>
+        <p:nvGrpSpPr>
+          <p:cNvPr id="50" name="Group 49"/>
+          <p:cNvGrpSpPr/>
+          <p:nvPr/>
+        </p:nvGrpSpPr>
+        <p:grpSpPr>
+          <a:xfrm>
+            <a:off x="3459854" y="1705970"/>
+            <a:ext cx="1191652" cy="3458766"/>
+            <a:chOff x="1574134" y="1899508"/>
+            <a:chExt cx="1387431" cy="3505592"/>
+          </a:xfrm>
+        </p:grpSpPr>
+        <p:sp>
+          <p:nvSpPr>
+            <p:cNvPr id="56" name="Oval 55"/>
+            <p:cNvSpPr/>
+            <p:nvPr/>
+          </p:nvSpPr>
+          <p:spPr>
+            <a:xfrm>
+              <a:off x="1574134" y="1899508"/>
+              <a:ext cx="1387430" cy="614148"/>
+            </a:xfrm>
+            <a:prstGeom prst="ellipse">
+              <a:avLst/>
+            </a:prstGeom>
+            <a:solidFill>
+              <a:schemeClr val="tx1"/>
+            </a:solidFill>
+            <a:ln>
+              <a:solidFill>
+                <a:schemeClr val="bg1"/>
+              </a:solidFill>
+            </a:ln>
+          </p:spPr>
+          <p:style>
+            <a:lnRef idx="2">
+              <a:schemeClr val="accent1">
+                <a:shade val="50000"/>
+              </a:schemeClr>
+            </a:lnRef>
+            <a:fillRef idx="1">
+              <a:schemeClr val="accent1"/>
+            </a:fillRef>
+            <a:effectRef idx="0">
+              <a:schemeClr val="accent1"/>
+            </a:effectRef>
+            <a:fontRef idx="minor">
+              <a:schemeClr val="lt1"/>
+            </a:fontRef>
+          </p:style>
+          <p:txBody>
+            <a:bodyPr rtlCol="0" anchor="ctr"/>
+            <a:lstStyle/>
+            <a:p>
+              <a:pPr algn="ctr"/>
+              <a:r>
+                <a:rPr lang="en-US" sz="1200" dirty="0">
+                  <a:solidFill>
+                    <a:schemeClr val="bg1"/>
+                  </a:solidFill>
+                </a:rPr>
+                <a:t>Classifier 1</a:t>
+              </a:r>
+            </a:p>
+          </p:txBody>
+        </p:sp>
+        <p:sp>
+          <p:nvSpPr>
+            <p:cNvPr id="57" name="Oval 56"/>
+            <p:cNvSpPr/>
+            <p:nvPr/>
+          </p:nvSpPr>
+          <p:spPr>
+            <a:xfrm>
+              <a:off x="1574134" y="2889365"/>
+              <a:ext cx="1387431" cy="614148"/>
+            </a:xfrm>
+            <a:prstGeom prst="ellipse">
+              <a:avLst/>
+            </a:prstGeom>
+            <a:solidFill>
+              <a:schemeClr val="tx1"/>
+            </a:solidFill>
+            <a:ln>
+              <a:solidFill>
+                <a:schemeClr val="bg1"/>
+              </a:solidFill>
+            </a:ln>
+          </p:spPr>
+          <p:style>
+            <a:lnRef idx="2">
+              <a:schemeClr val="accent1">
+                <a:shade val="50000"/>
+              </a:schemeClr>
+            </a:lnRef>
+            <a:fillRef idx="1">
+              <a:schemeClr val="accent1"/>
+            </a:fillRef>
+            <a:effectRef idx="0">
+              <a:schemeClr val="accent1"/>
+            </a:effectRef>
+            <a:fontRef idx="minor">
+              <a:schemeClr val="lt1"/>
+            </a:fontRef>
+          </p:style>
+          <p:txBody>
+            <a:bodyPr rtlCol="0" anchor="ctr"/>
+            <a:lstStyle/>
+            <a:p>
+              <a:pPr algn="ctr"/>
+              <a:r>
+                <a:rPr lang="en-US" sz="1200" dirty="0">
+                  <a:solidFill>
+                    <a:schemeClr val="bg1"/>
+                  </a:solidFill>
+                </a:rPr>
+                <a:t>Classifier 2</a:t>
+              </a:r>
+            </a:p>
+          </p:txBody>
+        </p:sp>
+        <p:sp>
+          <p:nvSpPr>
+            <p:cNvPr id="58" name="Oval 57"/>
+            <p:cNvSpPr/>
+            <p:nvPr/>
+          </p:nvSpPr>
+          <p:spPr>
+            <a:xfrm>
+              <a:off x="1574134" y="4790952"/>
+              <a:ext cx="1387431" cy="614148"/>
+            </a:xfrm>
+            <a:prstGeom prst="ellipse">
+              <a:avLst/>
+            </a:prstGeom>
+            <a:solidFill>
+              <a:schemeClr val="tx1"/>
+            </a:solidFill>
+            <a:ln>
+              <a:solidFill>
+                <a:schemeClr val="bg1"/>
+              </a:solidFill>
+            </a:ln>
+          </p:spPr>
+          <p:style>
+            <a:lnRef idx="2">
+              <a:schemeClr val="accent1">
+                <a:shade val="50000"/>
+              </a:schemeClr>
+            </a:lnRef>
+            <a:fillRef idx="1">
+              <a:schemeClr val="accent1"/>
+            </a:fillRef>
+            <a:effectRef idx="0">
+              <a:schemeClr val="accent1"/>
+            </a:effectRef>
+            <a:fontRef idx="minor">
+              <a:schemeClr val="lt1"/>
+            </a:fontRef>
+          </p:style>
+          <p:txBody>
+            <a:bodyPr rtlCol="0" anchor="ctr"/>
+            <a:lstStyle/>
+            <a:p>
+              <a:pPr algn="ctr"/>
+              <a:r>
+                <a:rPr lang="en-US" sz="1200" dirty="0">
+                  <a:solidFill>
+                    <a:schemeClr val="bg1"/>
+                  </a:solidFill>
+                </a:rPr>
+                <a:t>Classifier n</a:t>
+              </a:r>
+            </a:p>
+          </p:txBody>
+        </p:sp>
+        <p:sp>
+          <p:nvSpPr>
+            <p:cNvPr id="59" name="Rectangle 58"/>
+            <p:cNvSpPr/>
+            <p:nvPr/>
+          </p:nvSpPr>
+          <p:spPr>
+            <a:xfrm>
+              <a:off x="2263248" y="3582730"/>
+              <a:ext cx="68239" cy="95534"/>
+            </a:xfrm>
+            <a:prstGeom prst="rect">
+              <a:avLst/>
+            </a:prstGeom>
+            <a:gradFill flip="none" rotWithShape="1">
+              <a:gsLst>
+                <a:gs pos="0">
+                  <a:schemeClr val="bg1">
+                    <a:tint val="66000"/>
+                    <a:satMod val="160000"/>
+                  </a:schemeClr>
+                </a:gs>
+                <a:gs pos="50000">
+                  <a:schemeClr val="bg1">
+                    <a:tint val="44500"/>
+                    <a:satMod val="160000"/>
+                  </a:schemeClr>
+                </a:gs>
+                <a:gs pos="100000">
+                  <a:schemeClr val="bg1">
+                    <a:tint val="23500"/>
+                    <a:satMod val="160000"/>
+                  </a:schemeClr>
+                </a:gs>
+              </a:gsLst>
+              <a:lin ang="18900000" scaled="1"/>
+              <a:tileRect/>
+            </a:gradFill>
+            <a:ln>
+              <a:solidFill>
+                <a:schemeClr val="bg1"/>
+              </a:solidFill>
+            </a:ln>
+          </p:spPr>
+          <p:style>
+            <a:lnRef idx="2">
+              <a:schemeClr val="accent1">
+                <a:shade val="50000"/>
+              </a:schemeClr>
+            </a:lnRef>
+            <a:fillRef idx="1">
+              <a:schemeClr val="accent1"/>
+            </a:fillRef>
+            <a:effectRef idx="0">
+              <a:schemeClr val="accent1"/>
+            </a:effectRef>
+            <a:fontRef idx="minor">
+              <a:schemeClr val="lt1"/>
+            </a:fontRef>
+          </p:style>
+          <p:txBody>
+            <a:bodyPr rtlCol="0" anchor="ctr"/>
+            <a:lstStyle/>
+            <a:p>
+              <a:pPr algn="ctr"/>
+              <a:endParaRPr lang="en-US"/>
+            </a:p>
+          </p:txBody>
+        </p:sp>
+        <p:sp>
+          <p:nvSpPr>
+            <p:cNvPr id="60" name="Rectangle 59"/>
+            <p:cNvSpPr/>
+            <p:nvPr/>
+          </p:nvSpPr>
+          <p:spPr>
+            <a:xfrm>
+              <a:off x="2263248" y="3866515"/>
+              <a:ext cx="68239" cy="95534"/>
+            </a:xfrm>
+            <a:prstGeom prst="rect">
+              <a:avLst/>
+            </a:prstGeom>
+            <a:gradFill flip="none" rotWithShape="1">
+              <a:gsLst>
+                <a:gs pos="0">
+                  <a:schemeClr val="bg1">
+                    <a:tint val="66000"/>
+                    <a:satMod val="160000"/>
+                  </a:schemeClr>
+                </a:gs>
+                <a:gs pos="50000">
+                  <a:schemeClr val="bg1">
+                    <a:tint val="44500"/>
+                    <a:satMod val="160000"/>
+                  </a:schemeClr>
+                </a:gs>
+                <a:gs pos="100000">
+                  <a:schemeClr val="bg1">
+                    <a:tint val="23500"/>
+                    <a:satMod val="160000"/>
+                  </a:schemeClr>
+                </a:gs>
+              </a:gsLst>
+              <a:lin ang="18900000" scaled="1"/>
+              <a:tileRect/>
+            </a:gradFill>
+            <a:ln>
+              <a:solidFill>
+                <a:schemeClr val="bg1"/>
+              </a:solidFill>
+            </a:ln>
+          </p:spPr>
+          <p:style>
+            <a:lnRef idx="2">
+              <a:schemeClr val="accent1">
+                <a:shade val="50000"/>
+              </a:schemeClr>
+            </a:lnRef>
+            <a:fillRef idx="1">
+              <a:schemeClr val="accent1"/>
+            </a:fillRef>
+            <a:effectRef idx="0">
+              <a:schemeClr val="accent1"/>
+            </a:effectRef>
+            <a:fontRef idx="minor">
+              <a:schemeClr val="lt1"/>
+            </a:fontRef>
+          </p:style>
+          <p:txBody>
+            <a:bodyPr rtlCol="0" anchor="ctr"/>
+            <a:lstStyle/>
+            <a:p>
+              <a:pPr algn="ctr"/>
+              <a:endParaRPr lang="en-US"/>
+            </a:p>
+          </p:txBody>
+        </p:sp>
+        <p:sp>
+          <p:nvSpPr>
+            <p:cNvPr id="61" name="Rectangle 60"/>
+            <p:cNvSpPr/>
+            <p:nvPr/>
+          </p:nvSpPr>
+          <p:spPr>
+            <a:xfrm>
+              <a:off x="2263248" y="4089032"/>
+              <a:ext cx="68239" cy="95534"/>
+            </a:xfrm>
+            <a:prstGeom prst="rect">
+              <a:avLst/>
+            </a:prstGeom>
+            <a:gradFill flip="none" rotWithShape="1">
+              <a:gsLst>
+                <a:gs pos="0">
+                  <a:schemeClr val="bg1">
+                    <a:tint val="66000"/>
+                    <a:satMod val="160000"/>
+                  </a:schemeClr>
+                </a:gs>
+                <a:gs pos="50000">
+                  <a:schemeClr val="bg1">
+                    <a:tint val="44500"/>
+                    <a:satMod val="160000"/>
+                  </a:schemeClr>
+                </a:gs>
+                <a:gs pos="100000">
+                  <a:schemeClr val="bg1">
+                    <a:tint val="23500"/>
+                    <a:satMod val="160000"/>
+                  </a:schemeClr>
+                </a:gs>
+              </a:gsLst>
+              <a:lin ang="18900000" scaled="1"/>
+              <a:tileRect/>
+            </a:gradFill>
+            <a:ln>
+              <a:solidFill>
+                <a:schemeClr val="bg1"/>
+              </a:solidFill>
+            </a:ln>
+          </p:spPr>
+          <p:style>
+            <a:lnRef idx="2">
+              <a:schemeClr val="accent1">
+                <a:shade val="50000"/>
+              </a:schemeClr>
+            </a:lnRef>
+            <a:fillRef idx="1">
+              <a:schemeClr val="accent1"/>
+            </a:fillRef>
+            <a:effectRef idx="0">
+              <a:schemeClr val="accent1"/>
+            </a:effectRef>
+            <a:fontRef idx="minor">
+              <a:schemeClr val="lt1"/>
+            </a:fontRef>
+          </p:style>
+          <p:txBody>
+            <a:bodyPr rtlCol="0" anchor="ctr"/>
+            <a:lstStyle/>
+            <a:p>
+              <a:pPr algn="ctr"/>
+              <a:endParaRPr lang="en-US"/>
+            </a:p>
+          </p:txBody>
+        </p:sp>
+        <p:sp>
+          <p:nvSpPr>
+            <p:cNvPr id="62" name="Rectangle 61"/>
+            <p:cNvSpPr/>
+            <p:nvPr/>
+          </p:nvSpPr>
+          <p:spPr>
+            <a:xfrm>
+              <a:off x="2263247" y="4311549"/>
+              <a:ext cx="68239" cy="95534"/>
+            </a:xfrm>
+            <a:prstGeom prst="rect">
+              <a:avLst/>
+            </a:prstGeom>
+            <a:gradFill flip="none" rotWithShape="1">
+              <a:gsLst>
+                <a:gs pos="0">
+                  <a:schemeClr val="bg1">
+                    <a:tint val="66000"/>
+                    <a:satMod val="160000"/>
+                  </a:schemeClr>
+                </a:gs>
+                <a:gs pos="50000">
+                  <a:schemeClr val="bg1">
+                    <a:tint val="44500"/>
+                    <a:satMod val="160000"/>
+                  </a:schemeClr>
+                </a:gs>
+                <a:gs pos="100000">
+                  <a:schemeClr val="bg1">
+                    <a:tint val="23500"/>
+                    <a:satMod val="160000"/>
+                  </a:schemeClr>
+                </a:gs>
+              </a:gsLst>
+              <a:lin ang="18900000" scaled="1"/>
+              <a:tileRect/>
+            </a:gradFill>
+            <a:ln>
+              <a:solidFill>
+                <a:schemeClr val="bg1"/>
+              </a:solidFill>
+            </a:ln>
+          </p:spPr>
+          <p:style>
+            <a:lnRef idx="2">
+              <a:schemeClr val="accent1">
+                <a:shade val="50000"/>
+              </a:schemeClr>
+            </a:lnRef>
+            <a:fillRef idx="1">
+              <a:schemeClr val="accent1"/>
+            </a:fillRef>
+            <a:effectRef idx="0">
+              <a:schemeClr val="accent1"/>
+            </a:effectRef>
+            <a:fontRef idx="minor">
+              <a:schemeClr val="lt1"/>
+            </a:fontRef>
+          </p:style>
+          <p:txBody>
+            <a:bodyPr rtlCol="0" anchor="ctr"/>
+            <a:lstStyle/>
+            <a:p>
+              <a:pPr algn="ctr"/>
+              <a:endParaRPr lang="en-US"/>
+            </a:p>
+          </p:txBody>
+        </p:sp>
+        <p:sp>
+          <p:nvSpPr>
+            <p:cNvPr id="63" name="Rectangle 62"/>
+            <p:cNvSpPr/>
+            <p:nvPr/>
+          </p:nvSpPr>
+          <p:spPr>
+            <a:xfrm>
+              <a:off x="2263246" y="4568434"/>
+              <a:ext cx="68239" cy="95534"/>
+            </a:xfrm>
+            <a:prstGeom prst="rect">
+              <a:avLst/>
+            </a:prstGeom>
+            <a:gradFill flip="none" rotWithShape="1">
+              <a:gsLst>
+                <a:gs pos="0">
+                  <a:schemeClr val="bg1">
+                    <a:tint val="66000"/>
+                    <a:satMod val="160000"/>
+                  </a:schemeClr>
+                </a:gs>
+                <a:gs pos="50000">
+                  <a:schemeClr val="bg1">
+                    <a:tint val="44500"/>
+                    <a:satMod val="160000"/>
+                  </a:schemeClr>
+                </a:gs>
+                <a:gs pos="100000">
+                  <a:schemeClr val="bg1">
+                    <a:tint val="23500"/>
+                    <a:satMod val="160000"/>
+                  </a:schemeClr>
+                </a:gs>
+              </a:gsLst>
+              <a:lin ang="18900000" scaled="1"/>
+              <a:tileRect/>
+            </a:gradFill>
+            <a:ln>
+              <a:solidFill>
+                <a:schemeClr val="bg1"/>
+              </a:solidFill>
+            </a:ln>
+          </p:spPr>
+          <p:style>
+            <a:lnRef idx="2">
+              <a:schemeClr val="accent1">
+                <a:shade val="50000"/>
+              </a:schemeClr>
+            </a:lnRef>
+            <a:fillRef idx="1">
+              <a:schemeClr val="accent1"/>
+            </a:fillRef>
+            <a:effectRef idx="0">
+              <a:schemeClr val="accent1"/>
+            </a:effectRef>
+            <a:fontRef idx="minor">
+              <a:schemeClr val="lt1"/>
+            </a:fontRef>
+          </p:style>
+          <p:txBody>
+            <a:bodyPr rtlCol="0" anchor="ctr"/>
+            <a:lstStyle/>
+            <a:p>
+              <a:pPr algn="ctr"/>
+              <a:endParaRPr lang="en-US"/>
+            </a:p>
+          </p:txBody>
+        </p:sp>
+      </p:grpSp>
+      <p:cxnSp>
+        <p:nvCxnSpPr>
+          <p:cNvPr id="74" name="Straight Arrow Connector 73"/>
+          <p:cNvCxnSpPr/>
+          <p:nvPr/>
+        </p:nvCxnSpPr>
+        <p:spPr>
+          <a:xfrm flipV="1">
+            <a:off x="6278618" y="1815708"/>
+            <a:ext cx="1355730" cy="1"/>
+          </a:xfrm>
+          <a:prstGeom prst="straightConnector1">
+            <a:avLst/>
+          </a:prstGeom>
+          <a:ln w="28575">
+            <a:solidFill>
+              <a:srgbClr val="C00000"/>
+            </a:solidFill>
+            <a:tailEnd type="triangle"/>
+          </a:ln>
+        </p:spPr>
+        <p:style>
+          <a:lnRef idx="1">
+            <a:schemeClr val="accent1"/>
+          </a:lnRef>
+          <a:fillRef idx="0">
+            <a:schemeClr val="accent1"/>
+          </a:fillRef>
+          <a:effectRef idx="0">
+            <a:schemeClr val="accent1"/>
+          </a:effectRef>
+          <a:fontRef idx="minor">
+            <a:schemeClr val="tx1"/>
+          </a:fontRef>
+        </p:style>
+      </p:cxnSp>
+      <p:sp>
+        <p:nvSpPr>
+          <p:cNvPr id="81" name="TextBox 80"/>
+          <p:cNvSpPr txBox="1"/>
+          <p:nvPr/>
+        </p:nvSpPr>
+        <p:spPr>
+          <a:xfrm>
+            <a:off x="6365108" y="1537241"/>
+            <a:ext cx="1378424" cy="378572"/>
+          </a:xfrm>
+          <a:prstGeom prst="rect">
+            <a:avLst/>
+          </a:prstGeom>
+          <a:noFill/>
+        </p:spPr>
+        <p:txBody>
+          <a:bodyPr wrap="square" rtlCol="0">
+            <a:spAutoFit/>
+          </a:bodyPr>
+          <a:lstStyle/>
+          <a:p>
+            <a:r>
+              <a:rPr lang="en-US" sz="1400" dirty="0" smtClean="0"/>
+              <a:t>Predictions</a:t>
+            </a:r>
+            <a:endParaRPr lang="en-US" sz="1400" dirty="0"/>
+          </a:p>
+        </p:txBody>
+      </p:sp>
+      <p:grpSp>
+        <p:nvGrpSpPr>
+          <p:cNvPr id="17" name="Group 16"/>
+          <p:cNvGrpSpPr/>
+          <p:nvPr/>
+        </p:nvGrpSpPr>
+        <p:grpSpPr>
+          <a:xfrm>
+            <a:off x="6286617" y="2177528"/>
+            <a:ext cx="1443267" cy="307777"/>
+            <a:chOff x="4651506" y="4588149"/>
+            <a:chExt cx="1443267" cy="307777"/>
+          </a:xfrm>
+        </p:grpSpPr>
+        <p:cxnSp>
+          <p:nvCxnSpPr>
+            <p:cNvPr id="75" name="Straight Arrow Connector 74"/>
+            <p:cNvCxnSpPr>
+              <a:stCxn id="58" idx="6"/>
+            </p:cNvCxnSpPr>
+            <p:nvPr/>
+          </p:nvCxnSpPr>
+          <p:spPr>
+            <a:xfrm flipV="1">
+              <a:off x="4651506" y="4861763"/>
+              <a:ext cx="1355729" cy="1"/>
+            </a:xfrm>
+            <a:prstGeom prst="straightConnector1">
+              <a:avLst/>
+            </a:prstGeom>
+            <a:ln w="28575">
+              <a:solidFill>
+                <a:srgbClr val="C00000"/>
+              </a:solidFill>
+              <a:tailEnd type="triangle"/>
+            </a:ln>
+          </p:spPr>
+          <p:style>
+            <a:lnRef idx="1">
+              <a:schemeClr val="accent1"/>
+            </a:lnRef>
+            <a:fillRef idx="0">
+              <a:schemeClr val="accent1"/>
+            </a:fillRef>
+            <a:effectRef idx="0">
+              <a:schemeClr val="accent1"/>
+            </a:effectRef>
+            <a:fontRef idx="minor">
+              <a:schemeClr val="tx1"/>
+            </a:fontRef>
+          </p:style>
+        </p:cxnSp>
+        <p:sp>
+          <p:nvSpPr>
+            <p:cNvPr id="83" name="TextBox 82"/>
+            <p:cNvSpPr txBox="1"/>
+            <p:nvPr/>
+          </p:nvSpPr>
+          <p:spPr>
+            <a:xfrm>
+              <a:off x="4716349" y="4588149"/>
+              <a:ext cx="1378424" cy="307777"/>
+            </a:xfrm>
+            <a:prstGeom prst="rect">
+              <a:avLst/>
+            </a:prstGeom>
+            <a:noFill/>
+          </p:spPr>
+          <p:txBody>
+            <a:bodyPr wrap="square" rtlCol="0">
+              <a:spAutoFit/>
+            </a:bodyPr>
+            <a:lstStyle/>
+            <a:p>
+              <a:r>
+                <a:rPr lang="en-US" sz="1400" dirty="0" smtClean="0"/>
+                <a:t>Predictions</a:t>
+              </a:r>
+              <a:endParaRPr lang="en-US" sz="1400" dirty="0"/>
+            </a:p>
+          </p:txBody>
+        </p:sp>
+      </p:grpSp>
+      <p:sp>
+        <p:nvSpPr>
+          <p:cNvPr id="91" name="Rounded Rectangle 90"/>
+          <p:cNvSpPr/>
+          <p:nvPr/>
+        </p:nvSpPr>
+        <p:spPr>
+          <a:xfrm>
+            <a:off x="7654269" y="491767"/>
+            <a:ext cx="731728" cy="3034350"/>
+          </a:xfrm>
+          <a:prstGeom prst="roundRect">
+            <a:avLst/>
+          </a:prstGeom>
+          <a:gradFill flip="none" rotWithShape="1">
+            <a:gsLst>
+              <a:gs pos="0">
+                <a:schemeClr val="accent6">
+                  <a:lumMod val="60000"/>
+                  <a:lumOff val="40000"/>
+                  <a:shade val="30000"/>
+                  <a:satMod val="115000"/>
+                </a:schemeClr>
+              </a:gs>
+              <a:gs pos="50000">
+                <a:schemeClr val="accent6">
+                  <a:lumMod val="60000"/>
+                  <a:lumOff val="40000"/>
+                  <a:shade val="67500"/>
+                  <a:satMod val="115000"/>
+                </a:schemeClr>
+              </a:gs>
+              <a:gs pos="100000">
+                <a:schemeClr val="accent6">
+                  <a:lumMod val="60000"/>
+                  <a:lumOff val="40000"/>
+                  <a:shade val="100000"/>
+                  <a:satMod val="115000"/>
+                </a:schemeClr>
+              </a:gs>
+            </a:gsLst>
+            <a:lin ang="0" scaled="1"/>
+            <a:tileRect/>
+          </a:gradFill>
+          <a:ln>
+            <a:solidFill>
+              <a:schemeClr val="bg1"/>
+            </a:solidFill>
+          </a:ln>
+        </p:spPr>
+        <p:style>
+          <a:lnRef idx="2">
+            <a:schemeClr val="accent1">
+              <a:shade val="50000"/>
+            </a:schemeClr>
+          </a:lnRef>
+          <a:fillRef idx="1">
+            <a:schemeClr val="accent1"/>
+          </a:fillRef>
+          <a:effectRef idx="0">
+            <a:schemeClr val="accent1"/>
+          </a:effectRef>
+          <a:fontRef idx="minor">
+            <a:schemeClr val="lt1"/>
+          </a:fontRef>
+        </p:style>
+        <p:txBody>
+          <a:bodyPr vert="wordArtVert" rtlCol="0" anchor="ctr"/>
+          <a:lstStyle/>
+          <a:p>
+            <a:pPr algn="ctr"/>
+            <a:r>
+              <a:rPr lang="en-US" dirty="0" smtClean="0"/>
+              <a:t>Weight Adjusting</a:t>
+            </a:r>
+            <a:endParaRPr lang="en-US" dirty="0"/>
+          </a:p>
+        </p:txBody>
+      </p:sp>
+      <p:cxnSp>
+        <p:nvCxnSpPr>
+          <p:cNvPr id="66" name="Straight Arrow Connector 65"/>
+          <p:cNvCxnSpPr/>
+          <p:nvPr/>
+        </p:nvCxnSpPr>
+        <p:spPr>
+          <a:xfrm flipV="1">
+            <a:off x="6278221" y="3102522"/>
+            <a:ext cx="1355729" cy="1"/>
+          </a:xfrm>
+          <a:prstGeom prst="straightConnector1">
+            <a:avLst/>
+          </a:prstGeom>
+          <a:ln w="28575">
+            <a:solidFill>
+              <a:srgbClr val="C00000"/>
+            </a:solidFill>
+            <a:tailEnd type="triangle"/>
+          </a:ln>
+        </p:spPr>
+        <p:style>
+          <a:lnRef idx="1">
+            <a:schemeClr val="accent1"/>
+          </a:lnRef>
+          <a:fillRef idx="0">
+            <a:schemeClr val="accent1"/>
+          </a:fillRef>
+          <a:effectRef idx="0">
+            <a:schemeClr val="accent1"/>
+          </a:effectRef>
+          <a:fontRef idx="minor">
+            <a:schemeClr val="tx1"/>
+          </a:fontRef>
+        </p:style>
+      </p:cxnSp>
+      <p:sp>
+        <p:nvSpPr>
+          <p:cNvPr id="67" name="TextBox 66"/>
+          <p:cNvSpPr txBox="1"/>
+          <p:nvPr/>
+        </p:nvSpPr>
+        <p:spPr>
+          <a:xfrm>
+            <a:off x="6329416" y="2828908"/>
+            <a:ext cx="1378424" cy="307777"/>
+          </a:xfrm>
+          <a:prstGeom prst="rect">
+            <a:avLst/>
+          </a:prstGeom>
+          <a:noFill/>
+        </p:spPr>
+        <p:txBody>
+          <a:bodyPr wrap="square" rtlCol="0">
+            <a:spAutoFit/>
+          </a:bodyPr>
+          <a:lstStyle/>
+          <a:p>
+            <a:r>
+              <a:rPr lang="en-US" sz="1400" dirty="0" smtClean="0"/>
+              <a:t>Predictions</a:t>
+            </a:r>
+            <a:endParaRPr lang="en-US" sz="1400" dirty="0"/>
+          </a:p>
+        </p:txBody>
+      </p:sp>
+      <p:cxnSp>
+        <p:nvCxnSpPr>
+          <p:cNvPr id="24" name="Straight Arrow Connector 23"/>
+          <p:cNvCxnSpPr>
+            <a:stCxn id="56" idx="6"/>
+          </p:cNvCxnSpPr>
+          <p:nvPr/>
+        </p:nvCxnSpPr>
+        <p:spPr>
+          <a:xfrm flipV="1">
+            <a:off x="4651505" y="2008942"/>
+            <a:ext cx="710050" cy="1"/>
+          </a:xfrm>
+          <a:prstGeom prst="straightConnector1">
+            <a:avLst/>
+          </a:prstGeom>
+          <a:ln w="12700">
+            <a:tailEnd type="triangle"/>
+          </a:ln>
+        </p:spPr>
+        <p:style>
+          <a:lnRef idx="1">
+            <a:schemeClr val="accent1"/>
+          </a:lnRef>
+          <a:fillRef idx="0">
+            <a:schemeClr val="accent1"/>
+          </a:fillRef>
+          <a:effectRef idx="0">
+            <a:schemeClr val="accent1"/>
+          </a:effectRef>
+          <a:fontRef idx="minor">
+            <a:schemeClr val="tx1"/>
+          </a:fontRef>
+        </p:style>
+      </p:cxnSp>
+      <p:cxnSp>
+        <p:nvCxnSpPr>
+          <p:cNvPr id="28" name="Straight Arrow Connector 27"/>
+          <p:cNvCxnSpPr>
+            <a:stCxn id="57" idx="6"/>
+          </p:cNvCxnSpPr>
+          <p:nvPr/>
+        </p:nvCxnSpPr>
+        <p:spPr>
+          <a:xfrm flipV="1">
+            <a:off x="4651506" y="2600763"/>
+            <a:ext cx="710049" cy="384815"/>
+          </a:xfrm>
+          <a:prstGeom prst="straightConnector1">
+            <a:avLst/>
+          </a:prstGeom>
+          <a:ln w="12700">
+            <a:tailEnd type="triangle"/>
+          </a:ln>
+        </p:spPr>
+        <p:style>
+          <a:lnRef idx="1">
+            <a:schemeClr val="accent1"/>
+          </a:lnRef>
+          <a:fillRef idx="0">
+            <a:schemeClr val="accent1"/>
+          </a:fillRef>
+          <a:effectRef idx="0">
+            <a:schemeClr val="accent1"/>
+          </a:effectRef>
+          <a:fontRef idx="minor">
+            <a:schemeClr val="tx1"/>
+          </a:fontRef>
+        </p:style>
+      </p:cxnSp>
+      <p:cxnSp>
+        <p:nvCxnSpPr>
+          <p:cNvPr id="32" name="Straight Arrow Connector 31"/>
+          <p:cNvCxnSpPr>
+            <a:stCxn id="58" idx="6"/>
+          </p:cNvCxnSpPr>
+          <p:nvPr/>
+        </p:nvCxnSpPr>
+        <p:spPr>
+          <a:xfrm flipV="1">
+            <a:off x="4651506" y="3002901"/>
+            <a:ext cx="710049" cy="1858863"/>
+          </a:xfrm>
+          <a:prstGeom prst="straightConnector1">
+            <a:avLst/>
+          </a:prstGeom>
+          <a:ln w="12700">
+            <a:tailEnd type="triangle"/>
+          </a:ln>
+        </p:spPr>
+        <p:style>
+          <a:lnRef idx="1">
+            <a:schemeClr val="accent1"/>
+          </a:lnRef>
+          <a:fillRef idx="0">
+            <a:schemeClr val="accent1"/>
+          </a:fillRef>
+          <a:effectRef idx="0">
+            <a:schemeClr val="accent1"/>
+          </a:effectRef>
+          <a:fontRef idx="minor">
+            <a:schemeClr val="tx1"/>
+          </a:fontRef>
+        </p:style>
+      </p:cxnSp>
+      <p:sp>
+        <p:nvSpPr>
+          <p:cNvPr id="77" name="Rectangle 76"/>
+          <p:cNvSpPr/>
+          <p:nvPr/>
+        </p:nvSpPr>
+        <p:spPr>
+          <a:xfrm>
+            <a:off x="5408632" y="3675706"/>
+            <a:ext cx="869051" cy="1698904"/>
+          </a:xfrm>
+          <a:prstGeom prst="rect">
+            <a:avLst/>
+          </a:prstGeom>
+          <a:gradFill flip="none" rotWithShape="1">
+            <a:gsLst>
+              <a:gs pos="0">
+                <a:srgbClr val="00B0F0">
+                  <a:shade val="30000"/>
+                  <a:satMod val="115000"/>
+                </a:srgbClr>
+              </a:gs>
+              <a:gs pos="50000">
+                <a:srgbClr val="00B0F0">
+                  <a:shade val="67500"/>
+                  <a:satMod val="115000"/>
+                </a:srgbClr>
+              </a:gs>
+              <a:gs pos="100000">
+                <a:srgbClr val="00B0F0">
+                  <a:shade val="100000"/>
+                  <a:satMod val="115000"/>
+                </a:srgbClr>
+              </a:gs>
+            </a:gsLst>
+            <a:lin ang="5400000" scaled="1"/>
+            <a:tileRect/>
+          </a:gradFill>
+          <a:ln w="19050">
+            <a:solidFill>
+              <a:schemeClr val="bg1"/>
+            </a:solidFill>
+          </a:ln>
+        </p:spPr>
+        <p:style>
+          <a:lnRef idx="2">
+            <a:schemeClr val="accent1">
+              <a:shade val="50000"/>
+            </a:schemeClr>
+          </a:lnRef>
+          <a:fillRef idx="1">
+            <a:schemeClr val="accent1"/>
+          </a:fillRef>
+          <a:effectRef idx="0">
+            <a:schemeClr val="accent1"/>
+          </a:effectRef>
+          <a:fontRef idx="minor">
+            <a:schemeClr val="lt1"/>
+          </a:fontRef>
+        </p:style>
+        <p:txBody>
+          <a:bodyPr rtlCol="0" anchor="ctr"/>
+          <a:lstStyle/>
+          <a:p>
+            <a:pPr algn="ctr"/>
+            <a:r>
+              <a:rPr lang="en-US" sz="1200" dirty="0"/>
+              <a:t>Dataset </a:t>
+            </a:r>
+            <a:r>
+              <a:rPr lang="en-US" sz="1200" dirty="0" smtClean="0"/>
+              <a:t>3</a:t>
+            </a:r>
+            <a:endParaRPr lang="en-US" sz="1200" dirty="0"/>
+          </a:p>
+        </p:txBody>
+      </p:sp>
+      <p:grpSp>
+        <p:nvGrpSpPr>
+          <p:cNvPr id="69" name="Group 68"/>
+          <p:cNvGrpSpPr/>
+          <p:nvPr/>
+        </p:nvGrpSpPr>
+        <p:grpSpPr>
+          <a:xfrm>
+            <a:off x="203023" y="1690683"/>
+            <a:ext cx="2524037" cy="3505592"/>
+            <a:chOff x="69601" y="1705970"/>
+            <a:chExt cx="2524037" cy="3505592"/>
+          </a:xfrm>
+        </p:grpSpPr>
+        <p:grpSp>
+          <p:nvGrpSpPr>
+            <p:cNvPr id="47" name="Group 46"/>
+            <p:cNvGrpSpPr/>
+            <p:nvPr/>
+          </p:nvGrpSpPr>
+          <p:grpSpPr>
+            <a:xfrm>
+              <a:off x="951722" y="1705970"/>
+              <a:ext cx="1641916" cy="3505592"/>
+              <a:chOff x="1050878" y="1722088"/>
+              <a:chExt cx="1942537" cy="3505592"/>
+            </a:xfrm>
+          </p:grpSpPr>
+          <p:grpSp>
+            <p:nvGrpSpPr>
+              <p:cNvPr id="14" name="Group 13"/>
+              <p:cNvGrpSpPr/>
+              <p:nvPr/>
+            </p:nvGrpSpPr>
+            <p:grpSpPr>
+              <a:xfrm>
+                <a:off x="1610431" y="1722088"/>
+                <a:ext cx="1382984" cy="3505592"/>
+                <a:chOff x="1578580" y="1899508"/>
+                <a:chExt cx="1382984" cy="3505592"/>
+              </a:xfrm>
+            </p:grpSpPr>
+            <p:sp>
+              <p:nvSpPr>
+                <p:cNvPr id="6" name="Oval 5"/>
+                <p:cNvSpPr/>
+                <p:nvPr/>
+              </p:nvSpPr>
+              <p:spPr>
+                <a:xfrm>
+                  <a:off x="1578580" y="1899508"/>
+                  <a:ext cx="1382984" cy="618697"/>
+                </a:xfrm>
+                <a:prstGeom prst="ellipse">
+                  <a:avLst/>
+                </a:prstGeom>
+                <a:solidFill>
+                  <a:schemeClr val="tx1"/>
+                </a:solidFill>
+                <a:ln>
+                  <a:solidFill>
+                    <a:schemeClr val="bg1"/>
+                  </a:solidFill>
+                </a:ln>
+              </p:spPr>
+              <p:style>
+                <a:lnRef idx="2">
+                  <a:schemeClr val="accent1">
+                    <a:shade val="50000"/>
+                  </a:schemeClr>
+                </a:lnRef>
+                <a:fillRef idx="1">
+                  <a:schemeClr val="accent1"/>
+                </a:fillRef>
+                <a:effectRef idx="0">
+                  <a:schemeClr val="accent1"/>
+                </a:effectRef>
+                <a:fontRef idx="minor">
+                  <a:schemeClr val="lt1"/>
+                </a:fontRef>
+              </p:style>
+              <p:txBody>
+                <a:bodyPr rtlCol="0" anchor="ctr"/>
+                <a:lstStyle/>
+                <a:p>
+                  <a:pPr algn="ctr"/>
+                  <a:r>
+                    <a:rPr lang="en-US" sz="1200" dirty="0" smtClean="0">
+                      <a:solidFill>
+                        <a:schemeClr val="bg1"/>
+                      </a:solidFill>
+                    </a:rPr>
+                    <a:t>Classifier 1</a:t>
+                  </a:r>
+                  <a:endParaRPr lang="en-US" sz="1200" dirty="0">
+                    <a:solidFill>
+                      <a:schemeClr val="bg1"/>
+                    </a:solidFill>
+                  </a:endParaRPr>
+                </a:p>
+              </p:txBody>
+            </p:sp>
+            <p:sp>
+              <p:nvSpPr>
+                <p:cNvPr id="7" name="Oval 6"/>
+                <p:cNvSpPr/>
+                <p:nvPr/>
+              </p:nvSpPr>
+              <p:spPr>
+                <a:xfrm>
+                  <a:off x="1578580" y="2889365"/>
+                  <a:ext cx="1382984" cy="614149"/>
+                </a:xfrm>
+                <a:prstGeom prst="ellipse">
+                  <a:avLst/>
+                </a:prstGeom>
+                <a:solidFill>
+                  <a:schemeClr val="tx1"/>
+                </a:solidFill>
+                <a:ln>
+                  <a:solidFill>
+                    <a:schemeClr val="bg1"/>
+                  </a:solidFill>
+                </a:ln>
+              </p:spPr>
+              <p:style>
+                <a:lnRef idx="2">
+                  <a:schemeClr val="accent1">
+                    <a:shade val="50000"/>
+                  </a:schemeClr>
+                </a:lnRef>
+                <a:fillRef idx="1">
+                  <a:schemeClr val="accent1"/>
+                </a:fillRef>
+                <a:effectRef idx="0">
+                  <a:schemeClr val="accent1"/>
+                </a:effectRef>
+                <a:fontRef idx="minor">
+                  <a:schemeClr val="lt1"/>
+                </a:fontRef>
+              </p:style>
+              <p:txBody>
+                <a:bodyPr rtlCol="0" anchor="ctr"/>
+                <a:lstStyle/>
+                <a:p>
+                  <a:pPr algn="ctr"/>
+                  <a:r>
+                    <a:rPr lang="en-US" sz="1200" dirty="0">
+                      <a:solidFill>
+                        <a:schemeClr val="bg1"/>
+                      </a:solidFill>
+                    </a:rPr>
+                    <a:t>Classifier 2</a:t>
+                  </a:r>
+                </a:p>
+              </p:txBody>
+            </p:sp>
+            <p:sp>
+              <p:nvSpPr>
+                <p:cNvPr id="8" name="Oval 7"/>
+                <p:cNvSpPr/>
+                <p:nvPr/>
+              </p:nvSpPr>
+              <p:spPr>
+                <a:xfrm>
+                  <a:off x="1578580" y="4790951"/>
+                  <a:ext cx="1382984" cy="614149"/>
+                </a:xfrm>
+                <a:prstGeom prst="ellipse">
+                  <a:avLst/>
+                </a:prstGeom>
+                <a:solidFill>
+                  <a:schemeClr val="tx1"/>
+                </a:solidFill>
+                <a:ln>
+                  <a:solidFill>
+                    <a:schemeClr val="bg1"/>
+                  </a:solidFill>
+                </a:ln>
+              </p:spPr>
+              <p:style>
+                <a:lnRef idx="2">
+                  <a:schemeClr val="accent1">
+                    <a:shade val="50000"/>
+                  </a:schemeClr>
+                </a:lnRef>
+                <a:fillRef idx="1">
+                  <a:schemeClr val="accent1"/>
+                </a:fillRef>
+                <a:effectRef idx="0">
+                  <a:schemeClr val="accent1"/>
+                </a:effectRef>
+                <a:fontRef idx="minor">
+                  <a:schemeClr val="lt1"/>
+                </a:fontRef>
+              </p:style>
+              <p:txBody>
+                <a:bodyPr rtlCol="0" anchor="ctr"/>
+                <a:lstStyle/>
+                <a:p>
+                  <a:pPr algn="ctr"/>
+                  <a:r>
+                    <a:rPr lang="en-US" sz="1200" dirty="0">
+                      <a:solidFill>
+                        <a:schemeClr val="bg1"/>
+                      </a:solidFill>
+                    </a:rPr>
+                    <a:t>Classifier n</a:t>
+                  </a:r>
+                </a:p>
+              </p:txBody>
+            </p:sp>
+            <p:sp>
+              <p:nvSpPr>
+                <p:cNvPr id="9" name="Rectangle 8"/>
+                <p:cNvSpPr/>
+                <p:nvPr/>
+              </p:nvSpPr>
+              <p:spPr>
+                <a:xfrm>
+                  <a:off x="2263248" y="3582730"/>
+                  <a:ext cx="68239" cy="95534"/>
+                </a:xfrm>
+                <a:prstGeom prst="rect">
+                  <a:avLst/>
+                </a:prstGeom>
+                <a:gradFill flip="none" rotWithShape="1">
+                  <a:gsLst>
+                    <a:gs pos="0">
+                      <a:schemeClr val="bg1">
+                        <a:tint val="66000"/>
+                        <a:satMod val="160000"/>
+                      </a:schemeClr>
+                    </a:gs>
+                    <a:gs pos="50000">
+                      <a:schemeClr val="bg1">
+                        <a:tint val="44500"/>
+                        <a:satMod val="160000"/>
+                      </a:schemeClr>
+                    </a:gs>
+                    <a:gs pos="100000">
+                      <a:schemeClr val="bg1">
+                        <a:tint val="23500"/>
+                        <a:satMod val="160000"/>
+                      </a:schemeClr>
+                    </a:gs>
+                  </a:gsLst>
+                  <a:lin ang="18900000" scaled="1"/>
+                  <a:tileRect/>
+                </a:gradFill>
+                <a:ln>
+                  <a:solidFill>
+                    <a:schemeClr val="bg1"/>
+                  </a:solidFill>
+                </a:ln>
+              </p:spPr>
+              <p:style>
+                <a:lnRef idx="2">
+                  <a:schemeClr val="accent1">
+                    <a:shade val="50000"/>
+                  </a:schemeClr>
+                </a:lnRef>
+                <a:fillRef idx="1">
+                  <a:schemeClr val="accent1"/>
+                </a:fillRef>
+                <a:effectRef idx="0">
+                  <a:schemeClr val="accent1"/>
+                </a:effectRef>
+                <a:fontRef idx="minor">
+                  <a:schemeClr val="lt1"/>
+                </a:fontRef>
+              </p:style>
+              <p:txBody>
+                <a:bodyPr rtlCol="0" anchor="ctr"/>
+                <a:lstStyle/>
+                <a:p>
+                  <a:pPr algn="ctr"/>
+                  <a:endParaRPr lang="en-US"/>
+                </a:p>
+              </p:txBody>
+            </p:sp>
+            <p:sp>
+              <p:nvSpPr>
+                <p:cNvPr id="10" name="Rectangle 9"/>
+                <p:cNvSpPr/>
+                <p:nvPr/>
+              </p:nvSpPr>
+              <p:spPr>
+                <a:xfrm>
+                  <a:off x="2263248" y="3866515"/>
+                  <a:ext cx="68239" cy="95534"/>
+                </a:xfrm>
+                <a:prstGeom prst="rect">
+                  <a:avLst/>
+                </a:prstGeom>
+                <a:gradFill flip="none" rotWithShape="1">
+                  <a:gsLst>
+                    <a:gs pos="0">
+                      <a:schemeClr val="bg1">
+                        <a:tint val="66000"/>
+                        <a:satMod val="160000"/>
+                      </a:schemeClr>
+                    </a:gs>
+                    <a:gs pos="50000">
+                      <a:schemeClr val="bg1">
+                        <a:tint val="44500"/>
+                        <a:satMod val="160000"/>
+                      </a:schemeClr>
+                    </a:gs>
+                    <a:gs pos="100000">
+                      <a:schemeClr val="bg1">
+                        <a:tint val="23500"/>
+                        <a:satMod val="160000"/>
+                      </a:schemeClr>
+                    </a:gs>
+                  </a:gsLst>
+                  <a:lin ang="18900000" scaled="1"/>
+                  <a:tileRect/>
+                </a:gradFill>
+                <a:ln>
+                  <a:solidFill>
+                    <a:schemeClr val="bg1"/>
+                  </a:solidFill>
+                </a:ln>
+              </p:spPr>
+              <p:style>
+                <a:lnRef idx="2">
+                  <a:schemeClr val="accent1">
+                    <a:shade val="50000"/>
+                  </a:schemeClr>
+                </a:lnRef>
+                <a:fillRef idx="1">
+                  <a:schemeClr val="accent1"/>
+                </a:fillRef>
+                <a:effectRef idx="0">
+                  <a:schemeClr val="accent1"/>
+                </a:effectRef>
+                <a:fontRef idx="minor">
+                  <a:schemeClr val="lt1"/>
+                </a:fontRef>
+              </p:style>
+              <p:txBody>
+                <a:bodyPr rtlCol="0" anchor="ctr"/>
+                <a:lstStyle/>
+                <a:p>
+                  <a:pPr algn="ctr"/>
+                  <a:endParaRPr lang="en-US"/>
+                </a:p>
+              </p:txBody>
+            </p:sp>
+            <p:sp>
+              <p:nvSpPr>
+                <p:cNvPr id="11" name="Rectangle 10"/>
+                <p:cNvSpPr/>
+                <p:nvPr/>
+              </p:nvSpPr>
+              <p:spPr>
+                <a:xfrm>
+                  <a:off x="2263248" y="4089032"/>
+                  <a:ext cx="68239" cy="95534"/>
+                </a:xfrm>
+                <a:prstGeom prst="rect">
+                  <a:avLst/>
+                </a:prstGeom>
+                <a:gradFill flip="none" rotWithShape="1">
+                  <a:gsLst>
+                    <a:gs pos="0">
+                      <a:schemeClr val="bg1">
+                        <a:tint val="66000"/>
+                        <a:satMod val="160000"/>
+                      </a:schemeClr>
+                    </a:gs>
+                    <a:gs pos="50000">
+                      <a:schemeClr val="bg1">
+                        <a:tint val="44500"/>
+                        <a:satMod val="160000"/>
+                      </a:schemeClr>
+                    </a:gs>
+                    <a:gs pos="100000">
+                      <a:schemeClr val="bg1">
+                        <a:tint val="23500"/>
+                        <a:satMod val="160000"/>
+                      </a:schemeClr>
+                    </a:gs>
+                  </a:gsLst>
+                  <a:lin ang="18900000" scaled="1"/>
+                  <a:tileRect/>
+                </a:gradFill>
+                <a:ln>
+                  <a:solidFill>
+                    <a:schemeClr val="bg1"/>
+                  </a:solidFill>
+                </a:ln>
+              </p:spPr>
+              <p:style>
+                <a:lnRef idx="2">
+                  <a:schemeClr val="accent1">
+                    <a:shade val="50000"/>
+                  </a:schemeClr>
+                </a:lnRef>
+                <a:fillRef idx="1">
+                  <a:schemeClr val="accent1"/>
+                </a:fillRef>
+                <a:effectRef idx="0">
+                  <a:schemeClr val="accent1"/>
+                </a:effectRef>
+                <a:fontRef idx="minor">
+                  <a:schemeClr val="lt1"/>
+                </a:fontRef>
+              </p:style>
+              <p:txBody>
+                <a:bodyPr rtlCol="0" anchor="ctr"/>
+                <a:lstStyle/>
+                <a:p>
+                  <a:pPr algn="ctr"/>
+                  <a:endParaRPr lang="en-US"/>
+                </a:p>
+              </p:txBody>
+            </p:sp>
+            <p:sp>
+              <p:nvSpPr>
+                <p:cNvPr id="12" name="Rectangle 11"/>
+                <p:cNvSpPr/>
+                <p:nvPr/>
+              </p:nvSpPr>
+              <p:spPr>
+                <a:xfrm>
+                  <a:off x="2263247" y="4311549"/>
+                  <a:ext cx="68239" cy="95534"/>
+                </a:xfrm>
+                <a:prstGeom prst="rect">
+                  <a:avLst/>
+                </a:prstGeom>
+                <a:gradFill flip="none" rotWithShape="1">
+                  <a:gsLst>
+                    <a:gs pos="0">
+                      <a:schemeClr val="bg1">
+                        <a:tint val="66000"/>
+                        <a:satMod val="160000"/>
+                      </a:schemeClr>
+                    </a:gs>
+                    <a:gs pos="50000">
+                      <a:schemeClr val="bg1">
+                        <a:tint val="44500"/>
+                        <a:satMod val="160000"/>
+                      </a:schemeClr>
+                    </a:gs>
+                    <a:gs pos="100000">
+                      <a:schemeClr val="bg1">
+                        <a:tint val="23500"/>
+                        <a:satMod val="160000"/>
+                      </a:schemeClr>
+                    </a:gs>
+                  </a:gsLst>
+                  <a:lin ang="18900000" scaled="1"/>
+                  <a:tileRect/>
+                </a:gradFill>
+                <a:ln>
+                  <a:solidFill>
+                    <a:schemeClr val="bg1"/>
+                  </a:solidFill>
+                </a:ln>
+              </p:spPr>
+              <p:style>
+                <a:lnRef idx="2">
+                  <a:schemeClr val="accent1">
+                    <a:shade val="50000"/>
+                  </a:schemeClr>
+                </a:lnRef>
+                <a:fillRef idx="1">
+                  <a:schemeClr val="accent1"/>
+                </a:fillRef>
+                <a:effectRef idx="0">
+                  <a:schemeClr val="accent1"/>
+                </a:effectRef>
+                <a:fontRef idx="minor">
+                  <a:schemeClr val="lt1"/>
+                </a:fontRef>
+              </p:style>
+              <p:txBody>
+                <a:bodyPr rtlCol="0" anchor="ctr"/>
+                <a:lstStyle/>
+                <a:p>
+                  <a:pPr algn="ctr"/>
+                  <a:endParaRPr lang="en-US"/>
+                </a:p>
+              </p:txBody>
+            </p:sp>
+            <p:sp>
+              <p:nvSpPr>
+                <p:cNvPr id="13" name="Rectangle 12"/>
+                <p:cNvSpPr/>
+                <p:nvPr/>
+              </p:nvSpPr>
+              <p:spPr>
+                <a:xfrm>
+                  <a:off x="2263246" y="4568434"/>
+                  <a:ext cx="68239" cy="95534"/>
+                </a:xfrm>
+                <a:prstGeom prst="rect">
+                  <a:avLst/>
+                </a:prstGeom>
+                <a:gradFill flip="none" rotWithShape="1">
+                  <a:gsLst>
+                    <a:gs pos="0">
+                      <a:schemeClr val="bg1">
+                        <a:tint val="66000"/>
+                        <a:satMod val="160000"/>
+                      </a:schemeClr>
+                    </a:gs>
+                    <a:gs pos="50000">
+                      <a:schemeClr val="bg1">
+                        <a:tint val="44500"/>
+                        <a:satMod val="160000"/>
+                      </a:schemeClr>
+                    </a:gs>
+                    <a:gs pos="100000">
+                      <a:schemeClr val="bg1">
+                        <a:tint val="23500"/>
+                        <a:satMod val="160000"/>
+                      </a:schemeClr>
+                    </a:gs>
+                  </a:gsLst>
+                  <a:lin ang="18900000" scaled="1"/>
+                  <a:tileRect/>
+                </a:gradFill>
+                <a:ln>
+                  <a:solidFill>
+                    <a:schemeClr val="bg1"/>
+                  </a:solidFill>
+                </a:ln>
+              </p:spPr>
+              <p:style>
+                <a:lnRef idx="2">
+                  <a:schemeClr val="accent1">
+                    <a:shade val="50000"/>
+                  </a:schemeClr>
+                </a:lnRef>
+                <a:fillRef idx="1">
+                  <a:schemeClr val="accent1"/>
+                </a:fillRef>
+                <a:effectRef idx="0">
+                  <a:schemeClr val="accent1"/>
+                </a:effectRef>
+                <a:fontRef idx="minor">
+                  <a:schemeClr val="lt1"/>
+                </a:fontRef>
+              </p:style>
+              <p:txBody>
+                <a:bodyPr rtlCol="0" anchor="ctr"/>
+                <a:lstStyle/>
+                <a:p>
+                  <a:pPr algn="ctr"/>
+                  <a:endParaRPr lang="en-US"/>
+                </a:p>
+              </p:txBody>
+            </p:sp>
+          </p:grpSp>
+          <p:cxnSp>
+            <p:nvCxnSpPr>
+              <p:cNvPr id="16" name="Straight Connector 15"/>
+              <p:cNvCxnSpPr/>
+              <p:nvPr/>
+            </p:nvCxnSpPr>
+            <p:spPr>
+              <a:xfrm>
+                <a:off x="1330654" y="2029162"/>
+                <a:ext cx="0" cy="2891443"/>
+              </a:xfrm>
+              <a:prstGeom prst="line">
+                <a:avLst/>
+              </a:prstGeom>
+              <a:ln w="19050">
+                <a:solidFill>
+                  <a:schemeClr val="bg1"/>
+                </a:solidFill>
+              </a:ln>
+            </p:spPr>
+            <p:style>
+              <a:lnRef idx="1">
+                <a:schemeClr val="accent1"/>
+              </a:lnRef>
+              <a:fillRef idx="0">
+                <a:schemeClr val="accent1"/>
+              </a:fillRef>
+              <a:effectRef idx="0">
+                <a:schemeClr val="accent1"/>
+              </a:effectRef>
+              <a:fontRef idx="minor">
+                <a:schemeClr val="tx1"/>
+              </a:fontRef>
+            </p:style>
+          </p:cxnSp>
+          <p:cxnSp>
+            <p:nvCxnSpPr>
+              <p:cNvPr id="25" name="Straight Arrow Connector 24"/>
+              <p:cNvCxnSpPr>
+                <a:endCxn id="6" idx="2"/>
+              </p:cNvCxnSpPr>
+              <p:nvPr/>
+            </p:nvCxnSpPr>
+            <p:spPr>
+              <a:xfrm>
+                <a:off x="1330654" y="2029162"/>
+                <a:ext cx="279777" cy="2275"/>
+              </a:xfrm>
+              <a:prstGeom prst="straightConnector1">
+                <a:avLst/>
+              </a:prstGeom>
+              <a:ln w="19050">
+                <a:solidFill>
+                  <a:schemeClr val="bg1"/>
+                </a:solidFill>
+                <a:tailEnd type="triangle"/>
+              </a:ln>
+            </p:spPr>
+            <p:style>
+              <a:lnRef idx="1">
+                <a:schemeClr val="accent1"/>
+              </a:lnRef>
+              <a:fillRef idx="0">
+                <a:schemeClr val="accent1"/>
+              </a:fillRef>
+              <a:effectRef idx="0">
+                <a:schemeClr val="accent1"/>
+              </a:effectRef>
+              <a:fontRef idx="minor">
+                <a:schemeClr val="tx1"/>
+              </a:fontRef>
+            </p:style>
+          </p:cxnSp>
+          <p:cxnSp>
+            <p:nvCxnSpPr>
+              <p:cNvPr id="27" name="Straight Arrow Connector 26"/>
+              <p:cNvCxnSpPr>
+                <a:endCxn id="7" idx="2"/>
+              </p:cNvCxnSpPr>
+              <p:nvPr/>
+            </p:nvCxnSpPr>
+            <p:spPr>
+              <a:xfrm>
+                <a:off x="1330654" y="3019019"/>
+                <a:ext cx="279776" cy="1"/>
+              </a:xfrm>
+              <a:prstGeom prst="straightConnector1">
+                <a:avLst/>
+              </a:prstGeom>
+              <a:ln w="19050">
+                <a:solidFill>
+                  <a:schemeClr val="bg1"/>
+                </a:solidFill>
+                <a:tailEnd type="triangle"/>
+              </a:ln>
+            </p:spPr>
+            <p:style>
+              <a:lnRef idx="1">
+                <a:schemeClr val="accent1"/>
+              </a:lnRef>
+              <a:fillRef idx="0">
+                <a:schemeClr val="accent1"/>
+              </a:fillRef>
+              <a:effectRef idx="0">
+                <a:schemeClr val="accent1"/>
+              </a:effectRef>
+              <a:fontRef idx="minor">
+                <a:schemeClr val="tx1"/>
+              </a:fontRef>
+            </p:style>
+          </p:cxnSp>
+          <p:cxnSp>
+            <p:nvCxnSpPr>
+              <p:cNvPr id="29" name="Straight Arrow Connector 28"/>
+              <p:cNvCxnSpPr>
+                <a:endCxn id="8" idx="2"/>
+              </p:cNvCxnSpPr>
+              <p:nvPr/>
+            </p:nvCxnSpPr>
+            <p:spPr>
+              <a:xfrm>
+                <a:off x="1330654" y="4920605"/>
+                <a:ext cx="279776" cy="1"/>
+              </a:xfrm>
+              <a:prstGeom prst="straightConnector1">
+                <a:avLst/>
+              </a:prstGeom>
+              <a:ln w="19050">
+                <a:solidFill>
+                  <a:schemeClr val="bg1"/>
+                </a:solidFill>
+                <a:tailEnd type="triangle"/>
+              </a:ln>
+            </p:spPr>
+            <p:style>
+              <a:lnRef idx="1">
+                <a:schemeClr val="accent1"/>
+              </a:lnRef>
+              <a:fillRef idx="0">
+                <a:schemeClr val="accent1"/>
+              </a:fillRef>
+              <a:effectRef idx="0">
+                <a:schemeClr val="accent1"/>
+              </a:effectRef>
+              <a:fontRef idx="minor">
+                <a:schemeClr val="tx1"/>
+              </a:fontRef>
+            </p:style>
+          </p:cxnSp>
+          <p:cxnSp>
+            <p:nvCxnSpPr>
+              <p:cNvPr id="31" name="Straight Connector 30"/>
+              <p:cNvCxnSpPr/>
+              <p:nvPr/>
+            </p:nvCxnSpPr>
+            <p:spPr>
+              <a:xfrm>
+                <a:off x="1050878" y="3370997"/>
+                <a:ext cx="279776" cy="0"/>
+              </a:xfrm>
+              <a:prstGeom prst="line">
+                <a:avLst/>
+              </a:prstGeom>
+              <a:ln w="19050">
+                <a:solidFill>
+                  <a:schemeClr val="bg1"/>
+                </a:solidFill>
+              </a:ln>
+            </p:spPr>
+            <p:style>
+              <a:lnRef idx="1">
+                <a:schemeClr val="accent1"/>
+              </a:lnRef>
+              <a:fillRef idx="0">
+                <a:schemeClr val="accent1"/>
+              </a:fillRef>
+              <a:effectRef idx="0">
+                <a:schemeClr val="accent1"/>
+              </a:effectRef>
+              <a:fontRef idx="minor">
+                <a:schemeClr val="tx1"/>
+              </a:fontRef>
+            </p:style>
+          </p:cxnSp>
+        </p:grpSp>
+        <p:sp>
+          <p:nvSpPr>
+            <p:cNvPr id="79" name="Rectangle 78"/>
+            <p:cNvSpPr/>
+            <p:nvPr/>
+          </p:nvSpPr>
+          <p:spPr>
+            <a:xfrm>
+              <a:off x="69601" y="2532455"/>
+              <a:ext cx="869051" cy="1698904"/>
+            </a:xfrm>
+            <a:prstGeom prst="rect">
+              <a:avLst/>
+            </a:prstGeom>
+            <a:gradFill flip="none" rotWithShape="1">
+              <a:gsLst>
+                <a:gs pos="0">
+                  <a:srgbClr val="00B0F0">
+                    <a:shade val="30000"/>
+                    <a:satMod val="115000"/>
+                  </a:srgbClr>
+                </a:gs>
+                <a:gs pos="50000">
+                  <a:srgbClr val="00B0F0">
+                    <a:shade val="67500"/>
+                    <a:satMod val="115000"/>
+                  </a:srgbClr>
+                </a:gs>
+                <a:gs pos="100000">
+                  <a:srgbClr val="00B0F0">
+                    <a:shade val="100000"/>
+                    <a:satMod val="115000"/>
+                  </a:srgbClr>
+                </a:gs>
+              </a:gsLst>
+              <a:lin ang="5400000" scaled="1"/>
+              <a:tileRect/>
+            </a:gradFill>
+            <a:ln w="19050">
+              <a:solidFill>
+                <a:schemeClr val="bg1"/>
+              </a:solidFill>
+            </a:ln>
+          </p:spPr>
+          <p:style>
+            <a:lnRef idx="2">
+              <a:schemeClr val="accent1">
+                <a:shade val="50000"/>
+              </a:schemeClr>
+            </a:lnRef>
+            <a:fillRef idx="1">
+              <a:schemeClr val="accent1"/>
+            </a:fillRef>
+            <a:effectRef idx="0">
+              <a:schemeClr val="accent1"/>
+            </a:effectRef>
+            <a:fontRef idx="minor">
+              <a:schemeClr val="lt1"/>
+            </a:fontRef>
+          </p:style>
+          <p:txBody>
+            <a:bodyPr rtlCol="0" anchor="ctr"/>
+            <a:lstStyle/>
+            <a:p>
+              <a:pPr algn="ctr"/>
+              <a:r>
+                <a:rPr lang="en-US" sz="1200" dirty="0"/>
+                <a:t>Dataset </a:t>
+              </a:r>
+              <a:r>
+                <a:rPr lang="en-US" sz="1200" dirty="0" smtClean="0"/>
+                <a:t>1</a:t>
+              </a:r>
+              <a:endParaRPr lang="en-US" sz="1200" dirty="0"/>
+            </a:p>
+          </p:txBody>
+        </p:sp>
+      </p:grpSp>
+      <p:cxnSp>
+        <p:nvCxnSpPr>
+          <p:cNvPr id="34" name="Straight Arrow Connector 33"/>
+          <p:cNvCxnSpPr>
+            <a:stCxn id="56" idx="6"/>
+          </p:cNvCxnSpPr>
+          <p:nvPr/>
+        </p:nvCxnSpPr>
+        <p:spPr>
+          <a:xfrm>
+            <a:off x="4651505" y="2008943"/>
+            <a:ext cx="757127" cy="1951562"/>
+          </a:xfrm>
+          <a:prstGeom prst="straightConnector1">
+            <a:avLst/>
+          </a:prstGeom>
+          <a:ln w="12700">
+            <a:solidFill>
+              <a:srgbClr val="FFFF00"/>
+            </a:solidFill>
+            <a:tailEnd type="triangle"/>
+          </a:ln>
+        </p:spPr>
+        <p:style>
+          <a:lnRef idx="1">
+            <a:schemeClr val="accent1"/>
+          </a:lnRef>
+          <a:fillRef idx="0">
+            <a:schemeClr val="accent1"/>
+          </a:fillRef>
+          <a:effectRef idx="0">
+            <a:schemeClr val="accent1"/>
+          </a:effectRef>
+          <a:fontRef idx="minor">
+            <a:schemeClr val="tx1"/>
+          </a:fontRef>
+        </p:style>
+      </p:cxnSp>
+      <p:cxnSp>
+        <p:nvCxnSpPr>
+          <p:cNvPr id="36" name="Straight Arrow Connector 35"/>
+          <p:cNvCxnSpPr>
+            <a:stCxn id="57" idx="6"/>
+          </p:cNvCxnSpPr>
+          <p:nvPr/>
+        </p:nvCxnSpPr>
+        <p:spPr>
+          <a:xfrm>
+            <a:off x="4651506" y="2985578"/>
+            <a:ext cx="764750" cy="1290644"/>
+          </a:xfrm>
+          <a:prstGeom prst="straightConnector1">
+            <a:avLst/>
+          </a:prstGeom>
+          <a:ln w="12700">
+            <a:solidFill>
+              <a:srgbClr val="FFFF00"/>
+            </a:solidFill>
+            <a:tailEnd type="triangle"/>
+          </a:ln>
+        </p:spPr>
+        <p:style>
+          <a:lnRef idx="1">
+            <a:schemeClr val="accent1"/>
+          </a:lnRef>
+          <a:fillRef idx="0">
+            <a:schemeClr val="accent1"/>
+          </a:fillRef>
+          <a:effectRef idx="0">
+            <a:schemeClr val="accent1"/>
+          </a:effectRef>
+          <a:fontRef idx="minor">
+            <a:schemeClr val="tx1"/>
+          </a:fontRef>
+        </p:style>
+      </p:cxnSp>
+      <p:cxnSp>
+        <p:nvCxnSpPr>
+          <p:cNvPr id="39" name="Straight Arrow Connector 38"/>
+          <p:cNvCxnSpPr>
+            <a:stCxn id="58" idx="6"/>
+          </p:cNvCxnSpPr>
+          <p:nvPr/>
+        </p:nvCxnSpPr>
+        <p:spPr>
+          <a:xfrm flipV="1">
+            <a:off x="4651506" y="4861763"/>
+            <a:ext cx="785738" cy="1"/>
+          </a:xfrm>
+          <a:prstGeom prst="straightConnector1">
+            <a:avLst/>
+          </a:prstGeom>
+          <a:ln w="12700">
+            <a:solidFill>
+              <a:srgbClr val="FFFF00"/>
+            </a:solidFill>
+            <a:tailEnd type="triangle"/>
+          </a:ln>
+        </p:spPr>
+        <p:style>
+          <a:lnRef idx="1">
+            <a:schemeClr val="accent1"/>
+          </a:lnRef>
+          <a:fillRef idx="0">
+            <a:schemeClr val="accent1"/>
+          </a:fillRef>
+          <a:effectRef idx="0">
+            <a:schemeClr val="accent1"/>
+          </a:effectRef>
+          <a:fontRef idx="minor">
+            <a:schemeClr val="tx1"/>
+          </a:fontRef>
+        </p:style>
+      </p:cxnSp>
+      <p:grpSp>
+        <p:nvGrpSpPr>
+          <p:cNvPr id="42" name="Group 41"/>
+          <p:cNvGrpSpPr/>
+          <p:nvPr/>
+        </p:nvGrpSpPr>
+        <p:grpSpPr>
+          <a:xfrm>
+            <a:off x="9352161" y="2840369"/>
+            <a:ext cx="2839839" cy="2714270"/>
+            <a:chOff x="8910883" y="2451142"/>
+            <a:chExt cx="2804863" cy="2329308"/>
+          </a:xfrm>
+        </p:grpSpPr>
+        <p:sp>
+          <p:nvSpPr>
+            <p:cNvPr id="40" name="Right Arrow Callout 39"/>
+            <p:cNvSpPr/>
+            <p:nvPr/>
+          </p:nvSpPr>
+          <p:spPr>
+            <a:xfrm>
+              <a:off x="8910883" y="2451142"/>
+              <a:ext cx="1555845" cy="2329308"/>
+            </a:xfrm>
+            <a:prstGeom prst="rightArrowCallout">
+              <a:avLst/>
+            </a:prstGeom>
+            <a:gradFill flip="none" rotWithShape="1">
+              <a:gsLst>
+                <a:gs pos="0">
+                  <a:srgbClr val="00B050">
+                    <a:shade val="30000"/>
+                    <a:satMod val="115000"/>
+                  </a:srgbClr>
+                </a:gs>
+                <a:gs pos="50000">
+                  <a:srgbClr val="00B050">
+                    <a:shade val="67500"/>
+                    <a:satMod val="115000"/>
+                  </a:srgbClr>
+                </a:gs>
+                <a:gs pos="100000">
+                  <a:srgbClr val="00B050">
+                    <a:shade val="100000"/>
+                    <a:satMod val="115000"/>
+                  </a:srgbClr>
+                </a:gs>
+              </a:gsLst>
+              <a:lin ang="0" scaled="1"/>
+              <a:tileRect/>
+            </a:gradFill>
+            <a:ln>
+              <a:solidFill>
+                <a:schemeClr val="bg1"/>
+              </a:solidFill>
+            </a:ln>
+          </p:spPr>
+          <p:style>
+            <a:lnRef idx="2">
+              <a:schemeClr val="accent1">
+                <a:shade val="50000"/>
+              </a:schemeClr>
+            </a:lnRef>
+            <a:fillRef idx="1">
+              <a:schemeClr val="accent1"/>
+            </a:fillRef>
+            <a:effectRef idx="0">
+              <a:schemeClr val="accent1"/>
+            </a:effectRef>
+            <a:fontRef idx="minor">
+              <a:schemeClr val="lt1"/>
+            </a:fontRef>
+          </p:style>
+          <p:txBody>
+            <a:bodyPr vert="wordArtVert" rtlCol="0" anchor="ctr"/>
+            <a:lstStyle/>
+            <a:p>
+              <a:pPr algn="ctr"/>
+              <a:r>
+                <a:rPr lang="en-US" dirty="0" smtClean="0"/>
+                <a:t>Voting</a:t>
+              </a:r>
+              <a:endParaRPr lang="en-US" dirty="0"/>
+            </a:p>
+          </p:txBody>
+        </p:sp>
+        <p:sp>
+          <p:nvSpPr>
+            <p:cNvPr id="41" name="TextBox 40"/>
+            <p:cNvSpPr txBox="1"/>
+            <p:nvPr/>
+          </p:nvSpPr>
+          <p:spPr>
+            <a:xfrm>
+              <a:off x="10487448" y="3296930"/>
+              <a:ext cx="1228298" cy="554663"/>
+            </a:xfrm>
+            <a:prstGeom prst="rect">
+              <a:avLst/>
+            </a:prstGeom>
+            <a:noFill/>
+          </p:spPr>
+          <p:txBody>
+            <a:bodyPr wrap="square" rtlCol="0">
+              <a:spAutoFit/>
+            </a:bodyPr>
+            <a:lstStyle/>
+            <a:p>
+              <a:pPr algn="ctr"/>
+              <a:r>
+                <a:rPr lang="en-US" dirty="0" smtClean="0"/>
+                <a:t>Diagnosis Decision</a:t>
+              </a:r>
+              <a:endParaRPr lang="en-US" dirty="0"/>
+            </a:p>
+          </p:txBody>
+        </p:sp>
+      </p:grpSp>
+      <p:cxnSp>
+        <p:nvCxnSpPr>
+          <p:cNvPr id="90" name="Straight Arrow Connector 89"/>
+          <p:cNvCxnSpPr/>
+          <p:nvPr/>
+        </p:nvCxnSpPr>
+        <p:spPr>
+          <a:xfrm flipV="1">
+            <a:off x="6309162" y="4114258"/>
+            <a:ext cx="3066822" cy="1"/>
+          </a:xfrm>
+          <a:prstGeom prst="straightConnector1">
+            <a:avLst/>
+          </a:prstGeom>
+          <a:ln w="12700">
+            <a:solidFill>
+              <a:srgbClr val="FFFF00"/>
+            </a:solidFill>
+            <a:tailEnd type="triangle"/>
+          </a:ln>
+        </p:spPr>
+        <p:style>
+          <a:lnRef idx="1">
+            <a:schemeClr val="accent1"/>
+          </a:lnRef>
+          <a:fillRef idx="0">
+            <a:schemeClr val="accent1"/>
+          </a:fillRef>
+          <a:effectRef idx="0">
+            <a:schemeClr val="accent1"/>
+          </a:effectRef>
+          <a:fontRef idx="minor">
+            <a:schemeClr val="tx1"/>
+          </a:fontRef>
+        </p:style>
+      </p:cxnSp>
+      <p:sp>
+        <p:nvSpPr>
+          <p:cNvPr id="92" name="TextBox 91"/>
+          <p:cNvSpPr txBox="1"/>
+          <p:nvPr/>
+        </p:nvSpPr>
+        <p:spPr>
+          <a:xfrm>
+            <a:off x="7309856" y="3825617"/>
+            <a:ext cx="1378424" cy="378572"/>
+          </a:xfrm>
+          <a:prstGeom prst="rect">
+            <a:avLst/>
+          </a:prstGeom>
+          <a:noFill/>
+        </p:spPr>
+        <p:txBody>
+          <a:bodyPr wrap="square" rtlCol="0">
+            <a:spAutoFit/>
+          </a:bodyPr>
+          <a:lstStyle/>
+          <a:p>
+            <a:r>
+              <a:rPr lang="en-US" sz="1400" dirty="0" smtClean="0"/>
+              <a:t>Predictions</a:t>
+            </a:r>
+            <a:endParaRPr lang="en-US" sz="1400" dirty="0"/>
+          </a:p>
+        </p:txBody>
+      </p:sp>
+      <p:cxnSp>
+        <p:nvCxnSpPr>
+          <p:cNvPr id="110" name="Straight Arrow Connector 109"/>
+          <p:cNvCxnSpPr/>
+          <p:nvPr/>
+        </p:nvCxnSpPr>
+        <p:spPr>
+          <a:xfrm flipV="1">
+            <a:off x="6324760" y="4604574"/>
+            <a:ext cx="3051224" cy="1"/>
+          </a:xfrm>
+          <a:prstGeom prst="straightConnector1">
+            <a:avLst/>
+          </a:prstGeom>
+          <a:ln w="12700">
+            <a:solidFill>
+              <a:srgbClr val="FFFF00"/>
+            </a:solidFill>
+            <a:tailEnd type="triangle"/>
+          </a:ln>
+        </p:spPr>
+        <p:style>
+          <a:lnRef idx="1">
+            <a:schemeClr val="accent1"/>
+          </a:lnRef>
+          <a:fillRef idx="0">
+            <a:schemeClr val="accent1"/>
+          </a:fillRef>
+          <a:effectRef idx="0">
+            <a:schemeClr val="accent1"/>
+          </a:effectRef>
+          <a:fontRef idx="minor">
+            <a:schemeClr val="tx1"/>
+          </a:fontRef>
+        </p:style>
+      </p:cxnSp>
+      <p:sp>
+        <p:nvSpPr>
+          <p:cNvPr id="111" name="TextBox 110"/>
+          <p:cNvSpPr txBox="1"/>
+          <p:nvPr/>
+        </p:nvSpPr>
+        <p:spPr>
+          <a:xfrm>
+            <a:off x="7318837" y="4326151"/>
+            <a:ext cx="1378424" cy="378572"/>
+          </a:xfrm>
+          <a:prstGeom prst="rect">
+            <a:avLst/>
+          </a:prstGeom>
+          <a:noFill/>
+        </p:spPr>
+        <p:txBody>
+          <a:bodyPr wrap="square" rtlCol="0">
+            <a:spAutoFit/>
+          </a:bodyPr>
+          <a:lstStyle/>
+          <a:p>
+            <a:r>
+              <a:rPr lang="en-US" sz="1400" dirty="0" smtClean="0"/>
+              <a:t>Predictions</a:t>
+            </a:r>
+            <a:endParaRPr lang="en-US" sz="1400" dirty="0"/>
+          </a:p>
+        </p:txBody>
+      </p:sp>
+      <p:cxnSp>
+        <p:nvCxnSpPr>
+          <p:cNvPr id="113" name="Straight Arrow Connector 112"/>
+          <p:cNvCxnSpPr/>
+          <p:nvPr/>
+        </p:nvCxnSpPr>
+        <p:spPr>
+          <a:xfrm flipV="1">
+            <a:off x="6285339" y="5146520"/>
+            <a:ext cx="3090645" cy="1"/>
+          </a:xfrm>
+          <a:prstGeom prst="straightConnector1">
+            <a:avLst/>
+          </a:prstGeom>
+          <a:ln w="12700">
+            <a:solidFill>
+              <a:srgbClr val="FFFF00"/>
+            </a:solidFill>
+            <a:tailEnd type="triangle"/>
+          </a:ln>
+        </p:spPr>
+        <p:style>
+          <a:lnRef idx="1">
+            <a:schemeClr val="accent1"/>
+          </a:lnRef>
+          <a:fillRef idx="0">
+            <a:schemeClr val="accent1"/>
+          </a:fillRef>
+          <a:effectRef idx="0">
+            <a:schemeClr val="accent1"/>
+          </a:effectRef>
+          <a:fontRef idx="minor">
+            <a:schemeClr val="tx1"/>
+          </a:fontRef>
+        </p:style>
+      </p:cxnSp>
+      <p:sp>
+        <p:nvSpPr>
+          <p:cNvPr id="114" name="TextBox 113"/>
+          <p:cNvSpPr txBox="1"/>
+          <p:nvPr/>
+        </p:nvSpPr>
+        <p:spPr>
+          <a:xfrm>
+            <a:off x="7301384" y="4812930"/>
+            <a:ext cx="1378424" cy="378572"/>
+          </a:xfrm>
+          <a:prstGeom prst="rect">
+            <a:avLst/>
+          </a:prstGeom>
+          <a:noFill/>
+        </p:spPr>
+        <p:txBody>
+          <a:bodyPr wrap="square" rtlCol="0">
+            <a:spAutoFit/>
+          </a:bodyPr>
+          <a:lstStyle/>
+          <a:p>
+            <a:r>
+              <a:rPr lang="en-US" sz="1400" dirty="0" smtClean="0"/>
+              <a:t>Predictions</a:t>
+            </a:r>
+            <a:endParaRPr lang="en-US" sz="1400" dirty="0"/>
+          </a:p>
+        </p:txBody>
+      </p:sp>
+      <p:cxnSp>
+        <p:nvCxnSpPr>
+          <p:cNvPr id="64" name="Elbow Connector 63"/>
+          <p:cNvCxnSpPr>
+            <a:stCxn id="91" idx="3"/>
+            <a:endCxn id="40" idx="0"/>
+          </p:cNvCxnSpPr>
+          <p:nvPr/>
+        </p:nvCxnSpPr>
+        <p:spPr>
+          <a:xfrm>
+            <a:off x="8385997" y="2008942"/>
+            <a:ext cx="1477938" cy="831427"/>
+          </a:xfrm>
+          <a:prstGeom prst="bentConnector2">
+            <a:avLst/>
+          </a:prstGeom>
+          <a:ln w="19050">
+            <a:solidFill>
+              <a:schemeClr val="bg1"/>
+            </a:solidFill>
+            <a:tailEnd type="triangle"/>
+          </a:ln>
+        </p:spPr>
+        <p:style>
+          <a:lnRef idx="1">
+            <a:schemeClr val="accent1"/>
+          </a:lnRef>
+          <a:fillRef idx="0">
+            <a:schemeClr val="accent1"/>
+          </a:fillRef>
+          <a:effectRef idx="0">
+            <a:schemeClr val="accent1"/>
+          </a:effectRef>
+          <a:fontRef idx="minor">
+            <a:schemeClr val="tx1"/>
+          </a:fontRef>
+        </p:style>
+      </p:cxnSp>
+      <p:sp>
+        <p:nvSpPr>
+          <p:cNvPr id="68" name="TextBox 67"/>
+          <p:cNvSpPr txBox="1"/>
+          <p:nvPr/>
+        </p:nvSpPr>
+        <p:spPr>
+          <a:xfrm>
+            <a:off x="9194491" y="1337179"/>
+            <a:ext cx="2156347" cy="584775"/>
+          </a:xfrm>
+          <a:prstGeom prst="rect">
+            <a:avLst/>
+          </a:prstGeom>
+          <a:noFill/>
+        </p:spPr>
+        <p:txBody>
+          <a:bodyPr wrap="square" rtlCol="0">
+            <a:spAutoFit/>
+          </a:bodyPr>
+          <a:lstStyle/>
+          <a:p>
+            <a:pPr algn="ctr"/>
+            <a:r>
+              <a:rPr lang="en-US" sz="1600" dirty="0" smtClean="0"/>
+              <a:t>Weights for each of the classifiers</a:t>
+            </a:r>
+            <a:endParaRPr lang="en-US" sz="1600" dirty="0"/>
+          </a:p>
+        </p:txBody>
+      </p:sp>
+      <p:cxnSp>
+        <p:nvCxnSpPr>
+          <p:cNvPr id="71" name="Straight Connector 70"/>
+          <p:cNvCxnSpPr/>
+          <p:nvPr/>
+        </p:nvCxnSpPr>
+        <p:spPr>
+          <a:xfrm>
+            <a:off x="3070746" y="668740"/>
+            <a:ext cx="0" cy="5663821"/>
+          </a:xfrm>
+          <a:prstGeom prst="line">
+            <a:avLst/>
+          </a:prstGeom>
+          <a:ln w="19050">
+            <a:solidFill>
+              <a:schemeClr val="bg1"/>
+            </a:solidFill>
+            <a:prstDash val="lgDash"/>
+          </a:ln>
+        </p:spPr>
+        <p:style>
+          <a:lnRef idx="1">
+            <a:schemeClr val="accent1"/>
+          </a:lnRef>
+          <a:fillRef idx="0">
+            <a:schemeClr val="accent1"/>
+          </a:fillRef>
+          <a:effectRef idx="0">
+            <a:schemeClr val="accent1"/>
+          </a:effectRef>
+          <a:fontRef idx="minor">
+            <a:schemeClr val="tx1"/>
+          </a:fontRef>
+        </p:style>
+      </p:cxnSp>
+      <p:sp>
+        <p:nvSpPr>
+          <p:cNvPr id="72" name="TextBox 71"/>
+          <p:cNvSpPr txBox="1"/>
+          <p:nvPr/>
+        </p:nvSpPr>
+        <p:spPr>
+          <a:xfrm>
+            <a:off x="409433" y="5554639"/>
+            <a:ext cx="2129051" cy="646331"/>
+          </a:xfrm>
+          <a:prstGeom prst="rect">
+            <a:avLst/>
+          </a:prstGeom>
+          <a:noFill/>
+        </p:spPr>
+        <p:txBody>
+          <a:bodyPr wrap="square" rtlCol="0">
+            <a:spAutoFit/>
+          </a:bodyPr>
+          <a:lstStyle/>
+          <a:p>
+            <a:pPr algn="ctr"/>
+            <a:r>
+              <a:rPr lang="en-US" dirty="0" smtClean="0"/>
+              <a:t>Training the classifiers</a:t>
+            </a:r>
+            <a:endParaRPr lang="en-US" dirty="0"/>
+          </a:p>
+        </p:txBody>
+      </p:sp>
+      <p:sp>
+        <p:nvSpPr>
+          <p:cNvPr id="73" name="TextBox 72"/>
+          <p:cNvSpPr txBox="1"/>
+          <p:nvPr/>
+        </p:nvSpPr>
+        <p:spPr>
+          <a:xfrm>
+            <a:off x="3240384" y="1319900"/>
+            <a:ext cx="1739904" cy="307777"/>
+          </a:xfrm>
+          <a:prstGeom prst="rect">
+            <a:avLst/>
+          </a:prstGeom>
+          <a:noFill/>
+        </p:spPr>
+        <p:txBody>
+          <a:bodyPr wrap="square" rtlCol="0">
+            <a:spAutoFit/>
+          </a:bodyPr>
+          <a:lstStyle/>
+          <a:p>
+            <a:r>
+              <a:rPr lang="en-US" sz="1400" dirty="0" smtClean="0"/>
+              <a:t>Trained Classifiers</a:t>
+            </a:r>
+            <a:endParaRPr lang="en-US" sz="1400" dirty="0"/>
+          </a:p>
+        </p:txBody>
+      </p:sp>
     </p:spTree>
     <p:extLst>
       <p:ext uri="{BB962C8B-B14F-4D97-AF65-F5344CB8AC3E}">
-        <p14:creationId xmlns:p14="http://schemas.microsoft.com/office/powerpoint/2010/main" val="3585190817"/>
+        <p14:creationId xmlns:p14="http://schemas.microsoft.com/office/powerpoint/2010/main" val="2560300885"/>
       </p:ext>
     </p:extLst>
   </p:cSld>
@@ -8746,6 +11711,267 @@
               <a:rPr lang="en-US" sz="3200" b="1" u="sng" dirty="0"/>
               <a:t>The Weight Adjusting algorithm</a:t>
             </a:r>
+          </a:p>
+        </p:txBody>
+      </p:sp>
+      <p:sp>
+        <p:nvSpPr>
+          <p:cNvPr id="3" name="TextBox 2"/>
+          <p:cNvSpPr txBox="1"/>
+          <p:nvPr/>
+        </p:nvSpPr>
+        <p:spPr>
+          <a:xfrm>
+            <a:off x="341194" y="1514901"/>
+            <a:ext cx="11122925" cy="4524315"/>
+          </a:xfrm>
+          <a:prstGeom prst="rect">
+            <a:avLst/>
+          </a:prstGeom>
+          <a:noFill/>
+        </p:spPr>
+        <p:txBody>
+          <a:bodyPr wrap="square" rtlCol="0">
+            <a:spAutoFit/>
+          </a:bodyPr>
+          <a:lstStyle/>
+          <a:p>
+            <a:r>
+              <a:rPr lang="en-US" dirty="0"/>
+              <a:t>if (the number of positive votes &gt; = majority)</a:t>
+            </a:r>
+          </a:p>
+          <a:p>
+            <a:r>
+              <a:rPr lang="en-US" dirty="0"/>
+              <a:t>{</a:t>
+            </a:r>
+          </a:p>
+          <a:p>
+            <a:r>
+              <a:rPr lang="en-US" dirty="0"/>
+              <a:t>weight of </a:t>
+            </a:r>
+            <a:r>
+              <a:rPr lang="en-US" u="sng" dirty="0"/>
+              <a:t>each</a:t>
+            </a:r>
+            <a:r>
+              <a:rPr lang="en-US" dirty="0"/>
+              <a:t> correct classifier  + = </a:t>
+            </a:r>
+            <a:r>
+              <a:rPr lang="en-US" b="1" dirty="0"/>
+              <a:t>step_size1</a:t>
+            </a:r>
+            <a:r>
+              <a:rPr lang="en-US" dirty="0"/>
+              <a:t> / </a:t>
+            </a:r>
+            <a:r>
+              <a:rPr lang="en-US" dirty="0" smtClean="0"/>
+              <a:t>(#of </a:t>
+            </a:r>
+            <a:r>
+              <a:rPr lang="en-US" dirty="0"/>
+              <a:t>correct </a:t>
+            </a:r>
+            <a:r>
+              <a:rPr lang="en-US" dirty="0" smtClean="0"/>
+              <a:t>classifiers </a:t>
+            </a:r>
+            <a:r>
+              <a:rPr lang="en-US" dirty="0"/>
+              <a:t>/ </a:t>
+            </a:r>
+            <a:r>
+              <a:rPr lang="en-US" dirty="0" smtClean="0"/>
+              <a:t>#of incorrect classifiers)         </a:t>
+            </a:r>
+            <a:r>
+              <a:rPr lang="en-US" dirty="0"/>
+              <a:t>weight of </a:t>
+            </a:r>
+            <a:r>
+              <a:rPr lang="en-US" u="sng" dirty="0"/>
+              <a:t>each </a:t>
+            </a:r>
+            <a:r>
+              <a:rPr lang="en-US" dirty="0"/>
+              <a:t> </a:t>
+            </a:r>
+            <a:r>
+              <a:rPr lang="en-US" dirty="0" smtClean="0"/>
+              <a:t>incorrect classifier  - =   </a:t>
+            </a:r>
+            <a:r>
+              <a:rPr lang="en-US" b="1" dirty="0" smtClean="0"/>
+              <a:t>step_size1</a:t>
+            </a:r>
+            <a:endParaRPr lang="en-US" b="1" dirty="0"/>
+          </a:p>
+          <a:p>
+            <a:r>
+              <a:rPr lang="en-US" dirty="0"/>
+              <a:t>}</a:t>
+            </a:r>
+          </a:p>
+          <a:p>
+            <a:r>
+              <a:rPr lang="en-US" dirty="0"/>
+              <a:t> </a:t>
+            </a:r>
+          </a:p>
+          <a:p>
+            <a:endParaRPr lang="en-US" dirty="0" smtClean="0"/>
+          </a:p>
+          <a:p>
+            <a:endParaRPr lang="en-US" dirty="0"/>
+          </a:p>
+          <a:p>
+            <a:endParaRPr lang="en-US" dirty="0" smtClean="0"/>
+          </a:p>
+          <a:p>
+            <a:endParaRPr lang="en-US" dirty="0"/>
+          </a:p>
+          <a:p>
+            <a:r>
+              <a:rPr lang="en-US" dirty="0" smtClean="0"/>
+              <a:t>Else</a:t>
+            </a:r>
+            <a:endParaRPr lang="en-US" dirty="0"/>
+          </a:p>
+          <a:p>
+            <a:r>
+              <a:rPr lang="en-US" dirty="0"/>
+              <a:t>{</a:t>
+            </a:r>
+          </a:p>
+          <a:p>
+            <a:r>
+              <a:rPr lang="en-US" dirty="0"/>
+              <a:t>weight of </a:t>
+            </a:r>
+            <a:r>
+              <a:rPr lang="en-US" u="sng" dirty="0"/>
+              <a:t>each</a:t>
+            </a:r>
+            <a:r>
+              <a:rPr lang="en-US" dirty="0"/>
+              <a:t> correct classifier  + =  (# of </a:t>
+            </a:r>
+            <a:r>
+              <a:rPr lang="en-US" dirty="0"/>
+              <a:t>incorrect </a:t>
+            </a:r>
+            <a:r>
+              <a:rPr lang="en-US" dirty="0" smtClean="0"/>
+              <a:t>classifiers </a:t>
+            </a:r>
+            <a:r>
+              <a:rPr lang="en-US" dirty="0"/>
+              <a:t>/# of correct classifiers) * </a:t>
+            </a:r>
+            <a:r>
+              <a:rPr lang="en-US" b="1" dirty="0" smtClean="0"/>
+              <a:t>step_size2</a:t>
+            </a:r>
+            <a:endParaRPr lang="en-US" b="1" dirty="0"/>
+          </a:p>
+          <a:p>
+            <a:r>
+              <a:rPr lang="en-US" dirty="0"/>
+              <a:t>weight of </a:t>
+            </a:r>
+            <a:r>
+              <a:rPr lang="en-US" u="sng" dirty="0"/>
+              <a:t>each </a:t>
+            </a:r>
+            <a:r>
+              <a:rPr lang="en-US" dirty="0"/>
+              <a:t> </a:t>
+            </a:r>
+            <a:r>
+              <a:rPr lang="en-US" dirty="0" smtClean="0"/>
+              <a:t>incorrect classifier  </a:t>
+            </a:r>
+            <a:r>
+              <a:rPr lang="en-US" dirty="0"/>
+              <a:t>- =  </a:t>
+            </a:r>
+            <a:r>
+              <a:rPr lang="en-US" b="1" dirty="0"/>
+              <a:t>step_size2</a:t>
+            </a:r>
+          </a:p>
+          <a:p>
+            <a:r>
+              <a:rPr lang="en-US" dirty="0"/>
+              <a:t>}</a:t>
+            </a:r>
+          </a:p>
+          <a:p>
+            <a:endParaRPr lang="en-US" dirty="0"/>
+          </a:p>
+        </p:txBody>
+      </p:sp>
+      <p:sp>
+        <p:nvSpPr>
+          <p:cNvPr id="4" name="TextBox 3"/>
+          <p:cNvSpPr txBox="1"/>
+          <p:nvPr/>
+        </p:nvSpPr>
+        <p:spPr>
+          <a:xfrm>
+            <a:off x="5902656" y="1514901"/>
+            <a:ext cx="3016155" cy="369332"/>
+          </a:xfrm>
+          <a:prstGeom prst="rect">
+            <a:avLst/>
+          </a:prstGeom>
+          <a:noFill/>
+        </p:spPr>
+        <p:txBody>
+          <a:bodyPr wrap="square" rtlCol="0">
+            <a:spAutoFit/>
+          </a:bodyPr>
+          <a:lstStyle/>
+          <a:p>
+            <a:r>
+              <a:rPr lang="en-US" dirty="0" smtClean="0"/>
+              <a:t>Ex: 1 1 1 0 0</a:t>
+            </a:r>
+            <a:endParaRPr lang="en-US" dirty="0"/>
+          </a:p>
+        </p:txBody>
+      </p:sp>
+      <p:sp>
+        <p:nvSpPr>
+          <p:cNvPr id="5" name="TextBox 4"/>
+          <p:cNvSpPr txBox="1"/>
+          <p:nvPr/>
+        </p:nvSpPr>
+        <p:spPr>
+          <a:xfrm>
+            <a:off x="1483056" y="4219432"/>
+            <a:ext cx="3016155" cy="369332"/>
+          </a:xfrm>
+          <a:prstGeom prst="rect">
+            <a:avLst/>
+          </a:prstGeom>
+          <a:noFill/>
+        </p:spPr>
+        <p:txBody>
+          <a:bodyPr wrap="square" rtlCol="0">
+            <a:spAutoFit/>
+          </a:bodyPr>
+          <a:lstStyle/>
+          <a:p>
+            <a:r>
+              <a:rPr lang="en-US" dirty="0" smtClean="0"/>
+              <a:t>Ex: 1 1 0 0 0</a:t>
+            </a:r>
+            <a:endParaRPr lang="en-US" dirty="0"/>
           </a:p>
         </p:txBody>
       </p:sp>
@@ -8817,6 +12043,575 @@
           </a:p>
         </p:txBody>
       </p:sp>
+      <p:sp>
+        <p:nvSpPr>
+          <p:cNvPr id="4" name="TextBox 3"/>
+          <p:cNvSpPr txBox="1"/>
+          <p:nvPr/>
+        </p:nvSpPr>
+        <p:spPr>
+          <a:xfrm>
+            <a:off x="668741" y="1446663"/>
+            <a:ext cx="2306472" cy="369332"/>
+          </a:xfrm>
+          <a:prstGeom prst="rect">
+            <a:avLst/>
+          </a:prstGeom>
+          <a:noFill/>
+        </p:spPr>
+        <p:txBody>
+          <a:bodyPr wrap="square" rtlCol="0">
+            <a:spAutoFit/>
+          </a:bodyPr>
+          <a:lstStyle/>
+          <a:p>
+            <a:r>
+              <a:rPr lang="en-US" u="sng" dirty="0" smtClean="0"/>
+              <a:t># of Positive votes</a:t>
+            </a:r>
+            <a:endParaRPr lang="en-US" u="sng" dirty="0"/>
+          </a:p>
+        </p:txBody>
+      </p:sp>
+      <p:sp>
+        <p:nvSpPr>
+          <p:cNvPr id="5" name="TextBox 4"/>
+          <p:cNvSpPr txBox="1"/>
+          <p:nvPr/>
+        </p:nvSpPr>
+        <p:spPr>
+          <a:xfrm>
+            <a:off x="3168556" y="1446663"/>
+            <a:ext cx="2440674" cy="369332"/>
+          </a:xfrm>
+          <a:prstGeom prst="rect">
+            <a:avLst/>
+          </a:prstGeom>
+          <a:noFill/>
+        </p:spPr>
+        <p:txBody>
+          <a:bodyPr wrap="square" rtlCol="0">
+            <a:spAutoFit/>
+          </a:bodyPr>
+          <a:lstStyle>
+            <a:defPPr>
+              <a:defRPr lang="en-US"/>
+            </a:defPPr>
+            <a:lvl1pPr>
+              <a:defRPr u="sng"/>
+            </a:lvl1pPr>
+          </a:lstStyle>
+          <a:p>
+            <a:r>
+              <a:rPr lang="en-US" dirty="0"/>
+              <a:t># of Negative votes</a:t>
+            </a:r>
+          </a:p>
+        </p:txBody>
+      </p:sp>
+      <p:sp>
+        <p:nvSpPr>
+          <p:cNvPr id="6" name="TextBox 5"/>
+          <p:cNvSpPr txBox="1"/>
+          <p:nvPr/>
+        </p:nvSpPr>
+        <p:spPr>
+          <a:xfrm>
+            <a:off x="6168786" y="1460311"/>
+            <a:ext cx="3316407" cy="369332"/>
+          </a:xfrm>
+          <a:prstGeom prst="rect">
+            <a:avLst/>
+          </a:prstGeom>
+          <a:noFill/>
+        </p:spPr>
+        <p:txBody>
+          <a:bodyPr wrap="square" rtlCol="0">
+            <a:spAutoFit/>
+          </a:bodyPr>
+          <a:lstStyle>
+            <a:defPPr>
+              <a:defRPr lang="en-US"/>
+            </a:defPPr>
+            <a:lvl1pPr>
+              <a:defRPr u="sng"/>
+            </a:lvl1pPr>
+          </a:lstStyle>
+          <a:p>
+            <a:r>
+              <a:rPr lang="en-US" dirty="0"/>
+              <a:t>Decision of the Ensemble</a:t>
+            </a:r>
+          </a:p>
+        </p:txBody>
+      </p:sp>
+      <p:sp>
+        <p:nvSpPr>
+          <p:cNvPr id="7" name="TextBox 6"/>
+          <p:cNvSpPr txBox="1"/>
+          <p:nvPr/>
+        </p:nvSpPr>
+        <p:spPr>
+          <a:xfrm>
+            <a:off x="1255593" y="1978925"/>
+            <a:ext cx="777923" cy="369332"/>
+          </a:xfrm>
+          <a:prstGeom prst="rect">
+            <a:avLst/>
+          </a:prstGeom>
+          <a:noFill/>
+        </p:spPr>
+        <p:txBody>
+          <a:bodyPr wrap="square" rtlCol="0">
+            <a:spAutoFit/>
+          </a:bodyPr>
+          <a:lstStyle/>
+          <a:p>
+            <a:r>
+              <a:rPr lang="en-US" dirty="0" smtClean="0"/>
+              <a:t>3</a:t>
+            </a:r>
+            <a:endParaRPr lang="en-US" dirty="0"/>
+          </a:p>
+        </p:txBody>
+      </p:sp>
+      <p:sp>
+        <p:nvSpPr>
+          <p:cNvPr id="8" name="TextBox 7"/>
+          <p:cNvSpPr txBox="1"/>
+          <p:nvPr/>
+        </p:nvSpPr>
+        <p:spPr>
+          <a:xfrm>
+            <a:off x="4067032" y="1978925"/>
+            <a:ext cx="968991" cy="369332"/>
+          </a:xfrm>
+          <a:prstGeom prst="rect">
+            <a:avLst/>
+          </a:prstGeom>
+          <a:noFill/>
+        </p:spPr>
+        <p:txBody>
+          <a:bodyPr wrap="square" rtlCol="0">
+            <a:spAutoFit/>
+          </a:bodyPr>
+          <a:lstStyle/>
+          <a:p>
+            <a:r>
+              <a:rPr lang="en-US" dirty="0" smtClean="0"/>
+              <a:t>0</a:t>
+            </a:r>
+            <a:endParaRPr lang="en-US" dirty="0"/>
+          </a:p>
+        </p:txBody>
+      </p:sp>
+      <p:sp>
+        <p:nvSpPr>
+          <p:cNvPr id="9" name="TextBox 8"/>
+          <p:cNvSpPr txBox="1"/>
+          <p:nvPr/>
+        </p:nvSpPr>
+        <p:spPr>
+          <a:xfrm>
+            <a:off x="7069539" y="1978925"/>
+            <a:ext cx="1337481" cy="369332"/>
+          </a:xfrm>
+          <a:prstGeom prst="rect">
+            <a:avLst/>
+          </a:prstGeom>
+          <a:noFill/>
+        </p:spPr>
+        <p:txBody>
+          <a:bodyPr wrap="square" rtlCol="0">
+            <a:spAutoFit/>
+          </a:bodyPr>
+          <a:lstStyle/>
+          <a:p>
+            <a:r>
+              <a:rPr lang="en-US" dirty="0" smtClean="0"/>
+              <a:t>Diabetic</a:t>
+            </a:r>
+            <a:endParaRPr lang="en-US" dirty="0"/>
+          </a:p>
+        </p:txBody>
+      </p:sp>
+      <p:sp>
+        <p:nvSpPr>
+          <p:cNvPr id="11" name="TextBox 10"/>
+          <p:cNvSpPr txBox="1"/>
+          <p:nvPr/>
+        </p:nvSpPr>
+        <p:spPr>
+          <a:xfrm>
+            <a:off x="1255593" y="2612914"/>
+            <a:ext cx="777923" cy="369332"/>
+          </a:xfrm>
+          <a:prstGeom prst="rect">
+            <a:avLst/>
+          </a:prstGeom>
+          <a:noFill/>
+        </p:spPr>
+        <p:txBody>
+          <a:bodyPr wrap="square" rtlCol="0">
+            <a:spAutoFit/>
+          </a:bodyPr>
+          <a:lstStyle/>
+          <a:p>
+            <a:r>
+              <a:rPr lang="en-US" dirty="0" smtClean="0"/>
+              <a:t>3</a:t>
+            </a:r>
+            <a:endParaRPr lang="en-US" dirty="0"/>
+          </a:p>
+        </p:txBody>
+      </p:sp>
+      <p:sp>
+        <p:nvSpPr>
+          <p:cNvPr id="12" name="TextBox 11"/>
+          <p:cNvSpPr txBox="1"/>
+          <p:nvPr/>
+        </p:nvSpPr>
+        <p:spPr>
+          <a:xfrm>
+            <a:off x="4067032" y="2612914"/>
+            <a:ext cx="968991" cy="369332"/>
+          </a:xfrm>
+          <a:prstGeom prst="rect">
+            <a:avLst/>
+          </a:prstGeom>
+          <a:noFill/>
+        </p:spPr>
+        <p:txBody>
+          <a:bodyPr wrap="square" rtlCol="0">
+            <a:spAutoFit/>
+          </a:bodyPr>
+          <a:lstStyle/>
+          <a:p>
+            <a:r>
+              <a:rPr lang="en-US" dirty="0"/>
+              <a:t>2</a:t>
+            </a:r>
+          </a:p>
+        </p:txBody>
+      </p:sp>
+      <p:sp>
+        <p:nvSpPr>
+          <p:cNvPr id="13" name="TextBox 12"/>
+          <p:cNvSpPr txBox="1"/>
+          <p:nvPr/>
+        </p:nvSpPr>
+        <p:spPr>
+          <a:xfrm>
+            <a:off x="7083186" y="2612914"/>
+            <a:ext cx="1337481" cy="369332"/>
+          </a:xfrm>
+          <a:prstGeom prst="rect">
+            <a:avLst/>
+          </a:prstGeom>
+          <a:noFill/>
+        </p:spPr>
+        <p:txBody>
+          <a:bodyPr wrap="square" rtlCol="0">
+            <a:spAutoFit/>
+          </a:bodyPr>
+          <a:lstStyle/>
+          <a:p>
+            <a:r>
+              <a:rPr lang="en-US" dirty="0" smtClean="0"/>
+              <a:t>Diabetic</a:t>
+            </a:r>
+            <a:endParaRPr lang="en-US" dirty="0"/>
+          </a:p>
+        </p:txBody>
+      </p:sp>
+      <p:sp>
+        <p:nvSpPr>
+          <p:cNvPr id="14" name="TextBox 13"/>
+          <p:cNvSpPr txBox="1"/>
+          <p:nvPr/>
+        </p:nvSpPr>
+        <p:spPr>
+          <a:xfrm>
+            <a:off x="1248769" y="3503220"/>
+            <a:ext cx="777923" cy="369332"/>
+          </a:xfrm>
+          <a:prstGeom prst="rect">
+            <a:avLst/>
+          </a:prstGeom>
+          <a:noFill/>
+        </p:spPr>
+        <p:txBody>
+          <a:bodyPr wrap="square" rtlCol="0">
+            <a:spAutoFit/>
+          </a:bodyPr>
+          <a:lstStyle/>
+          <a:p>
+            <a:r>
+              <a:rPr lang="en-US" dirty="0"/>
+              <a:t>2</a:t>
+            </a:r>
+            <a:endParaRPr lang="en-US" dirty="0"/>
+          </a:p>
+        </p:txBody>
+      </p:sp>
+      <p:sp>
+        <p:nvSpPr>
+          <p:cNvPr id="15" name="TextBox 14"/>
+          <p:cNvSpPr txBox="1"/>
+          <p:nvPr/>
+        </p:nvSpPr>
+        <p:spPr>
+          <a:xfrm>
+            <a:off x="4019265" y="3421755"/>
+            <a:ext cx="968991" cy="369332"/>
+          </a:xfrm>
+          <a:prstGeom prst="rect">
+            <a:avLst/>
+          </a:prstGeom>
+          <a:noFill/>
+        </p:spPr>
+        <p:txBody>
+          <a:bodyPr wrap="square" rtlCol="0">
+            <a:spAutoFit/>
+          </a:bodyPr>
+          <a:lstStyle/>
+          <a:p>
+            <a:r>
+              <a:rPr lang="en-US" dirty="0"/>
+              <a:t>3</a:t>
+            </a:r>
+          </a:p>
+        </p:txBody>
+      </p:sp>
+      <p:sp>
+        <p:nvSpPr>
+          <p:cNvPr id="16" name="TextBox 15"/>
+          <p:cNvSpPr txBox="1"/>
+          <p:nvPr/>
+        </p:nvSpPr>
+        <p:spPr>
+          <a:xfrm>
+            <a:off x="7055890" y="3246903"/>
+            <a:ext cx="3343704" cy="1754326"/>
+          </a:xfrm>
+          <a:prstGeom prst="rect">
+            <a:avLst/>
+          </a:prstGeom>
+          <a:noFill/>
+        </p:spPr>
+        <p:txBody>
+          <a:bodyPr wrap="square" rtlCol="0">
+            <a:spAutoFit/>
+          </a:bodyPr>
+          <a:lstStyle/>
+          <a:p>
+            <a:r>
+              <a:rPr lang="en-US" dirty="0" smtClean="0"/>
+              <a:t>Diabetic, if the average weight of the positive voters is greater than the average weight of negative voters.</a:t>
+            </a:r>
+          </a:p>
+          <a:p>
+            <a:endParaRPr lang="en-US" dirty="0" smtClean="0"/>
+          </a:p>
+          <a:p>
+            <a:r>
+              <a:rPr lang="en-US" dirty="0" smtClean="0"/>
+              <a:t>Healthy otherwise.</a:t>
+            </a:r>
+            <a:endParaRPr lang="en-US" dirty="0"/>
+          </a:p>
+        </p:txBody>
+      </p:sp>
+      <p:sp>
+        <p:nvSpPr>
+          <p:cNvPr id="17" name="TextBox 16"/>
+          <p:cNvSpPr txBox="1"/>
+          <p:nvPr/>
+        </p:nvSpPr>
+        <p:spPr>
+          <a:xfrm>
+            <a:off x="1262416" y="5766179"/>
+            <a:ext cx="777923" cy="369332"/>
+          </a:xfrm>
+          <a:prstGeom prst="rect">
+            <a:avLst/>
+          </a:prstGeom>
+          <a:noFill/>
+        </p:spPr>
+        <p:txBody>
+          <a:bodyPr wrap="square" rtlCol="0">
+            <a:spAutoFit/>
+          </a:bodyPr>
+          <a:lstStyle/>
+          <a:p>
+            <a:r>
+              <a:rPr lang="en-US" dirty="0"/>
+              <a:t>0</a:t>
+            </a:r>
+            <a:endParaRPr lang="en-US" dirty="0"/>
+          </a:p>
+        </p:txBody>
+      </p:sp>
+      <p:sp>
+        <p:nvSpPr>
+          <p:cNvPr id="18" name="TextBox 17"/>
+          <p:cNvSpPr txBox="1"/>
+          <p:nvPr/>
+        </p:nvSpPr>
+        <p:spPr>
+          <a:xfrm>
+            <a:off x="4067032" y="5766179"/>
+            <a:ext cx="968991" cy="369332"/>
+          </a:xfrm>
+          <a:prstGeom prst="rect">
+            <a:avLst/>
+          </a:prstGeom>
+          <a:noFill/>
+        </p:spPr>
+        <p:txBody>
+          <a:bodyPr wrap="square" rtlCol="0">
+            <a:spAutoFit/>
+          </a:bodyPr>
+          <a:lstStyle/>
+          <a:p>
+            <a:r>
+              <a:rPr lang="en-US" dirty="0"/>
+              <a:t>5</a:t>
+            </a:r>
+          </a:p>
+        </p:txBody>
+      </p:sp>
+      <p:sp>
+        <p:nvSpPr>
+          <p:cNvPr id="20" name="TextBox 19"/>
+          <p:cNvSpPr txBox="1"/>
+          <p:nvPr/>
+        </p:nvSpPr>
+        <p:spPr>
+          <a:xfrm>
+            <a:off x="7055890" y="5766179"/>
+            <a:ext cx="1337481" cy="369332"/>
+          </a:xfrm>
+          <a:prstGeom prst="rect">
+            <a:avLst/>
+          </a:prstGeom>
+          <a:noFill/>
+        </p:spPr>
+        <p:txBody>
+          <a:bodyPr wrap="square" rtlCol="0">
+            <a:spAutoFit/>
+          </a:bodyPr>
+          <a:lstStyle/>
+          <a:p>
+            <a:r>
+              <a:rPr lang="en-US" dirty="0" smtClean="0"/>
+              <a:t>Healthy</a:t>
+            </a:r>
+            <a:endParaRPr lang="en-US" dirty="0"/>
+          </a:p>
+        </p:txBody>
+      </p:sp>
+      <p:sp>
+        <p:nvSpPr>
+          <p:cNvPr id="21" name="Right Brace 20"/>
+          <p:cNvSpPr/>
+          <p:nvPr/>
+        </p:nvSpPr>
+        <p:spPr>
+          <a:xfrm>
+            <a:off x="5247562" y="3375061"/>
+            <a:ext cx="1405721" cy="1498009"/>
+          </a:xfrm>
+          <a:prstGeom prst="rightBrace">
+            <a:avLst>
+              <a:gd name="adj1" fmla="val 8333"/>
+              <a:gd name="adj2" fmla="val 52166"/>
+            </a:avLst>
+          </a:prstGeom>
+        </p:spPr>
+        <p:style>
+          <a:lnRef idx="1">
+            <a:schemeClr val="accent1"/>
+          </a:lnRef>
+          <a:fillRef idx="0">
+            <a:schemeClr val="accent1"/>
+          </a:fillRef>
+          <a:effectRef idx="0">
+            <a:schemeClr val="accent1"/>
+          </a:effectRef>
+          <a:fontRef idx="minor">
+            <a:schemeClr val="tx1"/>
+          </a:fontRef>
+        </p:style>
+        <p:txBody>
+          <a:bodyPr rtlCol="0" anchor="ctr"/>
+          <a:lstStyle/>
+          <a:p>
+            <a:pPr algn="ctr"/>
+            <a:endParaRPr lang="en-US"/>
+          </a:p>
+        </p:txBody>
+      </p:sp>
+      <p:sp>
+        <p:nvSpPr>
+          <p:cNvPr id="22" name="TextBox 21"/>
+          <p:cNvSpPr txBox="1"/>
+          <p:nvPr/>
+        </p:nvSpPr>
+        <p:spPr>
+          <a:xfrm>
+            <a:off x="1255592" y="4296515"/>
+            <a:ext cx="777923" cy="369332"/>
+          </a:xfrm>
+          <a:prstGeom prst="rect">
+            <a:avLst/>
+          </a:prstGeom>
+          <a:noFill/>
+        </p:spPr>
+        <p:txBody>
+          <a:bodyPr wrap="square" rtlCol="0">
+            <a:spAutoFit/>
+          </a:bodyPr>
+          <a:lstStyle/>
+          <a:p>
+            <a:r>
+              <a:rPr lang="en-US" dirty="0" smtClean="0"/>
+              <a:t>2</a:t>
+            </a:r>
+            <a:endParaRPr lang="en-US" dirty="0"/>
+          </a:p>
+        </p:txBody>
+      </p:sp>
+      <p:sp>
+        <p:nvSpPr>
+          <p:cNvPr id="23" name="TextBox 22"/>
+          <p:cNvSpPr txBox="1"/>
+          <p:nvPr/>
+        </p:nvSpPr>
+        <p:spPr>
+          <a:xfrm>
+            <a:off x="4067032" y="4296515"/>
+            <a:ext cx="777923" cy="369332"/>
+          </a:xfrm>
+          <a:prstGeom prst="rect">
+            <a:avLst/>
+          </a:prstGeom>
+          <a:noFill/>
+        </p:spPr>
+        <p:txBody>
+          <a:bodyPr wrap="square" rtlCol="0">
+            <a:spAutoFit/>
+          </a:bodyPr>
+          <a:lstStyle/>
+          <a:p>
+            <a:r>
+              <a:rPr lang="en-US" dirty="0" smtClean="0"/>
+              <a:t>2</a:t>
+            </a:r>
+            <a:endParaRPr lang="en-US" dirty="0"/>
+          </a:p>
+        </p:txBody>
+      </p:sp>
     </p:spTree>
     <p:extLst>
       <p:ext uri="{BB962C8B-B14F-4D97-AF65-F5344CB8AC3E}">
@@ -8885,6 +12680,566 @@
           </a:p>
         </p:txBody>
       </p:sp>
+      <p:graphicFrame>
+        <p:nvGraphicFramePr>
+          <p:cNvPr id="3" name="Table 2"/>
+          <p:cNvGraphicFramePr>
+            <a:graphicFrameLocks noGrp="1"/>
+          </p:cNvGraphicFramePr>
+          <p:nvPr>
+            <p:extLst>
+              <p:ext uri="{D42A27DB-BD31-4B8C-83A1-F6EECF244321}">
+                <p14:modId xmlns:p14="http://schemas.microsoft.com/office/powerpoint/2010/main" val="3209367664"/>
+              </p:ext>
+            </p:extLst>
+          </p:nvPr>
+        </p:nvGraphicFramePr>
+        <p:xfrm>
+          <a:off x="1770418" y="1320168"/>
+          <a:ext cx="8383516" cy="3156297"/>
+        </p:xfrm>
+        <a:graphic>
+          <a:graphicData uri="http://schemas.openxmlformats.org/drawingml/2006/table">
+            <a:tbl>
+              <a:tblPr firstRow="1" bandRow="1">
+                <a:tableStyleId>{5C22544A-7EE6-4342-B048-85BDC9FD1C3A}</a:tableStyleId>
+              </a:tblPr>
+              <a:tblGrid>
+                <a:gridCol w="2095879"/>
+                <a:gridCol w="2095879"/>
+                <a:gridCol w="2095879"/>
+                <a:gridCol w="2095879"/>
+              </a:tblGrid>
+              <a:tr h="469266">
+                <a:tc>
+                  <a:txBody>
+                    <a:bodyPr/>
+                    <a:lstStyle/>
+                    <a:p>
+                      <a:r>
+                        <a:rPr lang="en-US" dirty="0" smtClean="0"/>
+                        <a:t>Classifier</a:t>
+                      </a:r>
+                      <a:endParaRPr lang="en-US" dirty="0"/>
+                    </a:p>
+                  </a:txBody>
+                  <a:tcPr/>
+                </a:tc>
+                <a:tc>
+                  <a:txBody>
+                    <a:bodyPr/>
+                    <a:lstStyle/>
+                    <a:p>
+                      <a:r>
+                        <a:rPr lang="en-US" dirty="0" smtClean="0"/>
+                        <a:t>Accuracy</a:t>
+                      </a:r>
+                      <a:endParaRPr lang="en-US" dirty="0"/>
+                    </a:p>
+                  </a:txBody>
+                  <a:tcPr/>
+                </a:tc>
+                <a:tc>
+                  <a:txBody>
+                    <a:bodyPr/>
+                    <a:lstStyle/>
+                    <a:p>
+                      <a:r>
+                        <a:rPr lang="en-US" dirty="0" smtClean="0"/>
+                        <a:t>Sensitivity</a:t>
+                      </a:r>
+                      <a:endParaRPr lang="en-US" dirty="0"/>
+                    </a:p>
+                  </a:txBody>
+                  <a:tcPr/>
+                </a:tc>
+                <a:tc>
+                  <a:txBody>
+                    <a:bodyPr/>
+                    <a:lstStyle/>
+                    <a:p>
+                      <a:r>
+                        <a:rPr lang="en-US" dirty="0" smtClean="0"/>
+                        <a:t>Specificity</a:t>
+                      </a:r>
+                      <a:endParaRPr lang="en-US" dirty="0"/>
+                    </a:p>
+                  </a:txBody>
+                  <a:tcPr/>
+                </a:tc>
+              </a:tr>
+              <a:tr h="469266">
+                <a:tc>
+                  <a:txBody>
+                    <a:bodyPr/>
+                    <a:lstStyle/>
+                    <a:p>
+                      <a:r>
+                        <a:rPr lang="en-US" dirty="0" smtClean="0"/>
+                        <a:t>Naïve Bayes</a:t>
+                      </a:r>
+                      <a:endParaRPr lang="en-US" dirty="0"/>
+                    </a:p>
+                  </a:txBody>
+                  <a:tcPr/>
+                </a:tc>
+                <a:tc>
+                  <a:txBody>
+                    <a:bodyPr/>
+                    <a:lstStyle/>
+                    <a:p>
+                      <a:r>
+                        <a:rPr lang="en-US" dirty="0" smtClean="0"/>
+                        <a:t>78.0991 %</a:t>
+                      </a:r>
+                      <a:endParaRPr lang="en-US" dirty="0"/>
+                    </a:p>
+                  </a:txBody>
+                  <a:tcPr/>
+                </a:tc>
+                <a:tc>
+                  <a:txBody>
+                    <a:bodyPr/>
+                    <a:lstStyle/>
+                    <a:p>
+                      <a:r>
+                        <a:rPr lang="en-US" b="1" dirty="0" smtClean="0"/>
+                        <a:t>63.8554 %</a:t>
+                      </a:r>
+                      <a:endParaRPr lang="en-US" b="1" dirty="0"/>
+                    </a:p>
+                  </a:txBody>
+                  <a:tcPr/>
+                </a:tc>
+                <a:tc>
+                  <a:txBody>
+                    <a:bodyPr/>
+                    <a:lstStyle/>
+                    <a:p>
+                      <a:r>
+                        <a:rPr lang="en-US" dirty="0" smtClean="0"/>
+                        <a:t>85.5345</a:t>
+                      </a:r>
+                      <a:r>
+                        <a:rPr lang="en-US" baseline="0" dirty="0" smtClean="0"/>
+                        <a:t> %</a:t>
+                      </a:r>
+                      <a:endParaRPr lang="en-US" dirty="0"/>
+                    </a:p>
+                  </a:txBody>
+                  <a:tcPr/>
+                </a:tc>
+              </a:tr>
+              <a:tr h="469266">
+                <a:tc>
+                  <a:txBody>
+                    <a:bodyPr/>
+                    <a:lstStyle/>
+                    <a:p>
+                      <a:r>
+                        <a:rPr lang="en-US" dirty="0" smtClean="0"/>
+                        <a:t>LDA</a:t>
+                      </a:r>
+                      <a:endParaRPr lang="en-US" dirty="0"/>
+                    </a:p>
+                  </a:txBody>
+                  <a:tcPr/>
+                </a:tc>
+                <a:tc>
+                  <a:txBody>
+                    <a:bodyPr/>
+                    <a:lstStyle/>
+                    <a:p>
+                      <a:r>
+                        <a:rPr lang="en-US" dirty="0" smtClean="0"/>
+                        <a:t>80.5785 %</a:t>
+                      </a:r>
+                      <a:endParaRPr lang="en-US" dirty="0"/>
+                    </a:p>
+                  </a:txBody>
+                  <a:tcPr/>
+                </a:tc>
+                <a:tc>
+                  <a:txBody>
+                    <a:bodyPr/>
+                    <a:lstStyle/>
+                    <a:p>
+                      <a:r>
+                        <a:rPr lang="en-US" b="1" dirty="0" smtClean="0"/>
+                        <a:t>59.0361 %</a:t>
+                      </a:r>
+                      <a:endParaRPr lang="en-US" b="1" dirty="0"/>
+                    </a:p>
+                  </a:txBody>
+                  <a:tcPr/>
+                </a:tc>
+                <a:tc>
+                  <a:txBody>
+                    <a:bodyPr/>
+                    <a:lstStyle/>
+                    <a:p>
+                      <a:r>
+                        <a:rPr lang="en-US" dirty="0" smtClean="0"/>
+                        <a:t>91.8238</a:t>
+                      </a:r>
+                      <a:r>
+                        <a:rPr lang="en-US" baseline="0" dirty="0" smtClean="0"/>
+                        <a:t> %</a:t>
+                      </a:r>
+                      <a:endParaRPr lang="en-US" dirty="0"/>
+                    </a:p>
+                  </a:txBody>
+                  <a:tcPr/>
+                </a:tc>
+              </a:tr>
+              <a:tr h="469266">
+                <a:tc>
+                  <a:txBody>
+                    <a:bodyPr/>
+                    <a:lstStyle/>
+                    <a:p>
+                      <a:r>
+                        <a:rPr lang="en-US" dirty="0" smtClean="0"/>
+                        <a:t>ADA </a:t>
+                      </a:r>
+                      <a:endParaRPr lang="en-US" dirty="0"/>
+                    </a:p>
+                  </a:txBody>
+                  <a:tcPr/>
+                </a:tc>
+                <a:tc>
+                  <a:txBody>
+                    <a:bodyPr/>
+                    <a:lstStyle/>
+                    <a:p>
+                      <a:r>
+                        <a:rPr lang="en-US" dirty="0" smtClean="0"/>
+                        <a:t>74.3801 %</a:t>
+                      </a:r>
+                      <a:endParaRPr lang="en-US" dirty="0"/>
+                    </a:p>
+                  </a:txBody>
+                  <a:tcPr/>
+                </a:tc>
+                <a:tc>
+                  <a:txBody>
+                    <a:bodyPr/>
+                    <a:lstStyle/>
+                    <a:p>
+                      <a:r>
+                        <a:rPr lang="en-US" b="1" dirty="0" smtClean="0"/>
+                        <a:t>56.6265</a:t>
+                      </a:r>
+                      <a:r>
+                        <a:rPr lang="en-US" b="1" baseline="0" dirty="0" smtClean="0"/>
+                        <a:t> %</a:t>
+                      </a:r>
+                      <a:endParaRPr lang="en-US" b="1" dirty="0"/>
+                    </a:p>
+                  </a:txBody>
+                  <a:tcPr/>
+                </a:tc>
+                <a:tc>
+                  <a:txBody>
+                    <a:bodyPr/>
+                    <a:lstStyle/>
+                    <a:p>
+                      <a:r>
+                        <a:rPr lang="en-US" dirty="0" smtClean="0"/>
+                        <a:t>83.6477 %</a:t>
+                      </a:r>
+                      <a:endParaRPr lang="en-US" dirty="0"/>
+                    </a:p>
+                  </a:txBody>
+                  <a:tcPr/>
+                </a:tc>
+              </a:tr>
+              <a:tr h="809967">
+                <a:tc>
+                  <a:txBody>
+                    <a:bodyPr/>
+                    <a:lstStyle/>
+                    <a:p>
+                      <a:r>
+                        <a:rPr lang="en-US" dirty="0" smtClean="0"/>
+                        <a:t>Support</a:t>
+                      </a:r>
+                      <a:r>
+                        <a:rPr lang="en-US" baseline="0" dirty="0" smtClean="0"/>
+                        <a:t> Vector Machines</a:t>
+                      </a:r>
+                      <a:endParaRPr lang="en-US" dirty="0"/>
+                    </a:p>
+                  </a:txBody>
+                  <a:tcPr/>
+                </a:tc>
+                <a:tc>
+                  <a:txBody>
+                    <a:bodyPr/>
+                    <a:lstStyle/>
+                    <a:p>
+                      <a:r>
+                        <a:rPr lang="en-US" dirty="0" smtClean="0"/>
+                        <a:t>78.9256 %</a:t>
+                      </a:r>
+                      <a:endParaRPr lang="en-US" dirty="0"/>
+                    </a:p>
+                  </a:txBody>
+                  <a:tcPr/>
+                </a:tc>
+                <a:tc>
+                  <a:txBody>
+                    <a:bodyPr/>
+                    <a:lstStyle/>
+                    <a:p>
+                      <a:r>
+                        <a:rPr lang="en-US" b="1" dirty="0" smtClean="0"/>
+                        <a:t>53.0120 %</a:t>
+                      </a:r>
+                      <a:endParaRPr lang="en-US" b="1" dirty="0"/>
+                    </a:p>
+                  </a:txBody>
+                  <a:tcPr/>
+                </a:tc>
+                <a:tc>
+                  <a:txBody>
+                    <a:bodyPr/>
+                    <a:lstStyle/>
+                    <a:p>
+                      <a:r>
+                        <a:rPr lang="en-US" dirty="0" smtClean="0"/>
+                        <a:t>92.4528</a:t>
+                      </a:r>
+                      <a:r>
+                        <a:rPr lang="en-US" baseline="0" dirty="0" smtClean="0"/>
+                        <a:t> %</a:t>
+                      </a:r>
+                      <a:endParaRPr lang="en-US" dirty="0"/>
+                    </a:p>
+                  </a:txBody>
+                  <a:tcPr/>
+                </a:tc>
+              </a:tr>
+              <a:tr h="469266">
+                <a:tc>
+                  <a:txBody>
+                    <a:bodyPr/>
+                    <a:lstStyle/>
+                    <a:p>
+                      <a:r>
+                        <a:rPr lang="en-US" dirty="0" smtClean="0"/>
+                        <a:t>Random Forests</a:t>
+                      </a:r>
+                      <a:endParaRPr lang="en-US" dirty="0"/>
+                    </a:p>
+                  </a:txBody>
+                  <a:tcPr/>
+                </a:tc>
+                <a:tc>
+                  <a:txBody>
+                    <a:bodyPr/>
+                    <a:lstStyle/>
+                    <a:p>
+                      <a:r>
+                        <a:rPr lang="en-US" dirty="0" smtClean="0"/>
+                        <a:t>76.8595 %</a:t>
+                      </a:r>
+                      <a:endParaRPr lang="en-US" dirty="0"/>
+                    </a:p>
+                  </a:txBody>
+                  <a:tcPr/>
+                </a:tc>
+                <a:tc>
+                  <a:txBody>
+                    <a:bodyPr/>
+                    <a:lstStyle/>
+                    <a:p>
+                      <a:r>
+                        <a:rPr lang="en-US" b="1" dirty="0" smtClean="0"/>
+                        <a:t>42.1686 %</a:t>
+                      </a:r>
+                      <a:endParaRPr lang="en-US" b="1" dirty="0"/>
+                    </a:p>
+                  </a:txBody>
+                  <a:tcPr/>
+                </a:tc>
+                <a:tc>
+                  <a:txBody>
+                    <a:bodyPr/>
+                    <a:lstStyle/>
+                    <a:p>
+                      <a:r>
+                        <a:rPr lang="en-US" dirty="0" smtClean="0"/>
+                        <a:t>94.9685 %</a:t>
+                      </a:r>
+                      <a:endParaRPr lang="en-US" dirty="0"/>
+                    </a:p>
+                  </a:txBody>
+                  <a:tcPr/>
+                </a:tc>
+              </a:tr>
+            </a:tbl>
+          </a:graphicData>
+        </a:graphic>
+      </p:graphicFrame>
+      <p:graphicFrame>
+        <p:nvGraphicFramePr>
+          <p:cNvPr id="5" name="Table 4"/>
+          <p:cNvGraphicFramePr>
+            <a:graphicFrameLocks noGrp="1"/>
+          </p:cNvGraphicFramePr>
+          <p:nvPr>
+            <p:extLst>
+              <p:ext uri="{D42A27DB-BD31-4B8C-83A1-F6EECF244321}">
+                <p14:modId xmlns:p14="http://schemas.microsoft.com/office/powerpoint/2010/main" val="3748878086"/>
+              </p:ext>
+            </p:extLst>
+          </p:nvPr>
+        </p:nvGraphicFramePr>
+        <p:xfrm>
+          <a:off x="1770418" y="4955929"/>
+          <a:ext cx="8383516" cy="1130503"/>
+        </p:xfrm>
+        <a:graphic>
+          <a:graphicData uri="http://schemas.openxmlformats.org/drawingml/2006/table">
+            <a:tbl>
+              <a:tblPr firstRow="1" bandRow="1">
+                <a:tableStyleId>{5C22544A-7EE6-4342-B048-85BDC9FD1C3A}</a:tableStyleId>
+              </a:tblPr>
+              <a:tblGrid>
+                <a:gridCol w="2095879"/>
+                <a:gridCol w="2095879"/>
+                <a:gridCol w="2095879"/>
+                <a:gridCol w="2095879"/>
+              </a:tblGrid>
+              <a:tr h="490423">
+                <a:tc>
+                  <a:txBody>
+                    <a:bodyPr/>
+                    <a:lstStyle/>
+                    <a:p>
+                      <a:r>
+                        <a:rPr lang="en-US" dirty="0" smtClean="0"/>
+                        <a:t>Classifier</a:t>
+                      </a:r>
+                      <a:endParaRPr lang="en-US" dirty="0"/>
+                    </a:p>
+                  </a:txBody>
+                  <a:tcPr/>
+                </a:tc>
+                <a:tc>
+                  <a:txBody>
+                    <a:bodyPr/>
+                    <a:lstStyle/>
+                    <a:p>
+                      <a:r>
+                        <a:rPr lang="en-US" dirty="0" smtClean="0"/>
+                        <a:t>Accuracy</a:t>
+                      </a:r>
+                      <a:endParaRPr lang="en-US" dirty="0"/>
+                    </a:p>
+                  </a:txBody>
+                  <a:tcPr/>
+                </a:tc>
+                <a:tc>
+                  <a:txBody>
+                    <a:bodyPr/>
+                    <a:lstStyle/>
+                    <a:p>
+                      <a:r>
+                        <a:rPr lang="en-US" dirty="0" smtClean="0"/>
+                        <a:t>Sensitivity</a:t>
+                      </a:r>
+                      <a:endParaRPr lang="en-US" dirty="0"/>
+                    </a:p>
+                  </a:txBody>
+                  <a:tcPr/>
+                </a:tc>
+                <a:tc>
+                  <a:txBody>
+                    <a:bodyPr/>
+                    <a:lstStyle/>
+                    <a:p>
+                      <a:r>
+                        <a:rPr lang="en-US" dirty="0" smtClean="0"/>
+                        <a:t>Specificity</a:t>
+                      </a:r>
+                      <a:endParaRPr lang="en-US" dirty="0"/>
+                    </a:p>
+                  </a:txBody>
+                  <a:tcPr/>
+                </a:tc>
+              </a:tr>
+              <a:tr h="490423">
+                <a:tc>
+                  <a:txBody>
+                    <a:bodyPr/>
+                    <a:lstStyle/>
+                    <a:p>
+                      <a:r>
+                        <a:rPr lang="en-US" dirty="0" smtClean="0"/>
+                        <a:t>Ensemble of 5 classifiers</a:t>
+                      </a:r>
+                      <a:endParaRPr lang="en-US" dirty="0"/>
+                    </a:p>
+                  </a:txBody>
+                  <a:tcPr/>
+                </a:tc>
+                <a:tc>
+                  <a:txBody>
+                    <a:bodyPr/>
+                    <a:lstStyle/>
+                    <a:p>
+                      <a:r>
+                        <a:rPr lang="en-US" dirty="0" smtClean="0"/>
+                        <a:t>80.0256 %</a:t>
+                      </a:r>
+                      <a:endParaRPr lang="en-US" dirty="0"/>
+                    </a:p>
+                  </a:txBody>
+                  <a:tcPr/>
+                </a:tc>
+                <a:tc>
+                  <a:txBody>
+                    <a:bodyPr/>
+                    <a:lstStyle/>
+                    <a:p>
+                      <a:r>
+                        <a:rPr lang="en-US" b="1" dirty="0" smtClean="0">
+                          <a:solidFill>
+                            <a:srgbClr val="00B050"/>
+                          </a:solidFill>
+                        </a:rPr>
+                        <a:t>66.2650 %</a:t>
+                      </a:r>
+                      <a:endParaRPr lang="en-US" b="1" dirty="0">
+                        <a:solidFill>
+                          <a:srgbClr val="00B050"/>
+                        </a:solidFill>
+                      </a:endParaRPr>
+                    </a:p>
+                  </a:txBody>
+                  <a:tcPr/>
+                </a:tc>
+                <a:tc>
+                  <a:txBody>
+                    <a:bodyPr/>
+                    <a:lstStyle/>
+                    <a:p>
+                      <a:r>
+                        <a:rPr lang="en-US" dirty="0" smtClean="0"/>
+                        <a:t>85.5345 %</a:t>
+                      </a:r>
+                      <a:endParaRPr lang="en-US" dirty="0"/>
+                    </a:p>
+                  </a:txBody>
+                  <a:tcPr/>
+                </a:tc>
+              </a:tr>
+            </a:tbl>
+          </a:graphicData>
+        </a:graphic>
+      </p:graphicFrame>
     </p:spTree>
     <p:extLst>
       <p:ext uri="{BB962C8B-B14F-4D97-AF65-F5344CB8AC3E}">
@@ -8953,6 +13308,36 @@
           </a:p>
         </p:txBody>
       </p:sp>
+      <p:pic>
+        <p:nvPicPr>
+          <p:cNvPr id="3" name="Picture 2"/>
+          <p:cNvPicPr>
+            <a:picLocks noChangeAspect="1"/>
+          </p:cNvPicPr>
+          <p:nvPr/>
+        </p:nvPicPr>
+        <p:blipFill>
+          <a:blip r:embed="rId2">
+            <a:extLst>
+              <a:ext uri="{28A0092B-C50C-407E-A947-70E740481C1C}">
+                <a14:useLocalDpi xmlns:a14="http://schemas.microsoft.com/office/drawing/2010/main" val="0"/>
+              </a:ext>
+            </a:extLst>
+          </a:blip>
+          <a:stretch>
+            <a:fillRect/>
+          </a:stretch>
+        </p:blipFill>
+        <p:spPr>
+          <a:xfrm>
+            <a:off x="2702257" y="1241946"/>
+            <a:ext cx="6264321" cy="5158854"/>
+          </a:xfrm>
+          <a:prstGeom prst="rect">
+            <a:avLst/>
+          </a:prstGeom>
+        </p:spPr>
+      </p:pic>
     </p:spTree>
     <p:extLst>
       <p:ext uri="{BB962C8B-B14F-4D97-AF65-F5344CB8AC3E}">
@@ -8999,7 +13384,7 @@
         <p:spPr>
           <a:xfrm>
             <a:off x="2661313" y="191069"/>
-            <a:ext cx="6032311" cy="646331"/>
+            <a:ext cx="6032311" cy="584775"/>
           </a:xfrm>
           <a:prstGeom prst="rect">
             <a:avLst/>
@@ -9014,7 +13399,7 @@
           <a:p>
             <a:pPr algn="ctr"/>
             <a:r>
-              <a:rPr lang="en-US" sz="3600" b="1" u="sng" dirty="0" smtClean="0"/>
+              <a:rPr lang="en-US" sz="3200" b="1" u="sng" dirty="0" smtClean="0"/>
               <a:t>Challenges</a:t>
             </a:r>
             <a:endParaRPr lang="en-US" sz="3600" b="1" u="sng" dirty="0"/>
@@ -9029,7 +13414,7 @@
         </p:nvSpPr>
         <p:spPr>
           <a:xfrm>
-            <a:off x="286603" y="1187355"/>
+            <a:off x="300251" y="678253"/>
             <a:ext cx="11737075" cy="369332"/>
           </a:xfrm>
           <a:prstGeom prst="rect">
@@ -9062,13 +13447,13 @@
           <p:nvPr>
             <p:extLst>
               <p:ext uri="{D42A27DB-BD31-4B8C-83A1-F6EECF244321}">
-                <p14:modId xmlns:p14="http://schemas.microsoft.com/office/powerpoint/2010/main" val="3113522782"/>
+                <p14:modId xmlns:p14="http://schemas.microsoft.com/office/powerpoint/2010/main" val="1867165890"/>
               </p:ext>
             </p:extLst>
           </p:nvPr>
         </p:nvGraphicFramePr>
         <p:xfrm>
-          <a:off x="1827282" y="1688658"/>
+          <a:off x="1718100" y="862919"/>
           <a:ext cx="7453195" cy="4780382"/>
         </p:xfrm>
         <a:graphic>
@@ -9077,6 +13462,40 @@
           </a:graphicData>
         </a:graphic>
       </p:graphicFrame>
+      <p:sp>
+        <p:nvSpPr>
+          <p:cNvPr id="4" name="TextBox 3"/>
+          <p:cNvSpPr txBox="1"/>
+          <p:nvPr/>
+        </p:nvSpPr>
+        <p:spPr>
+          <a:xfrm>
+            <a:off x="300251" y="5868537"/>
+            <a:ext cx="11600597" cy="369332"/>
+          </a:xfrm>
+          <a:prstGeom prst="rect">
+            <a:avLst/>
+          </a:prstGeom>
+          <a:noFill/>
+        </p:spPr>
+        <p:txBody>
+          <a:bodyPr wrap="square" rtlCol="0">
+            <a:spAutoFit/>
+          </a:bodyPr>
+          <a:lstStyle/>
+          <a:p>
+            <a:pPr marL="285750" indent="-285750">
+              <a:buFont typeface="Arial" panose="020B0604020202020204" pitchFamily="34" charset="0"/>
+              <a:buChar char="•"/>
+            </a:pPr>
+            <a:r>
+              <a:rPr lang="en-US" dirty="0" smtClean="0"/>
+              <a:t>Very few samples – 768 only!!</a:t>
+            </a:r>
+            <a:endParaRPr lang="en-US" dirty="0"/>
+          </a:p>
+        </p:txBody>
+      </p:sp>
     </p:spTree>
     <p:extLst>
       <p:ext uri="{BB962C8B-B14F-4D97-AF65-F5344CB8AC3E}">

</xml_diff>